<commit_message>
Update slides for group project
</commit_message>
<xml_diff>
--- a/GroupProject/GroupProject.pptx
+++ b/GroupProject/GroupProject.pptx
@@ -5,21 +5,23 @@
     <p:sldMasterId id="2147483725" r:id="rId1"/>
   </p:sldMasterIdLst>
   <p:notesMasterIdLst>
-    <p:notesMasterId r:id="rId14"/>
+    <p:notesMasterId r:id="rId16"/>
   </p:notesMasterIdLst>
   <p:sldIdLst>
     <p:sldId id="256" r:id="rId2"/>
     <p:sldId id="257" r:id="rId3"/>
     <p:sldId id="265" r:id="rId4"/>
-    <p:sldId id="259" r:id="rId5"/>
-    <p:sldId id="260" r:id="rId6"/>
-    <p:sldId id="262" r:id="rId7"/>
-    <p:sldId id="261" r:id="rId8"/>
-    <p:sldId id="266" r:id="rId9"/>
-    <p:sldId id="267" r:id="rId10"/>
-    <p:sldId id="263" r:id="rId11"/>
-    <p:sldId id="258" r:id="rId12"/>
-    <p:sldId id="264" r:id="rId13"/>
+    <p:sldId id="260" r:id="rId5"/>
+    <p:sldId id="259" r:id="rId6"/>
+    <p:sldId id="268" r:id="rId7"/>
+    <p:sldId id="262" r:id="rId8"/>
+    <p:sldId id="261" r:id="rId9"/>
+    <p:sldId id="266" r:id="rId10"/>
+    <p:sldId id="267" r:id="rId11"/>
+    <p:sldId id="263" r:id="rId12"/>
+    <p:sldId id="269" r:id="rId13"/>
+    <p:sldId id="258" r:id="rId14"/>
+    <p:sldId id="264" r:id="rId15"/>
   </p:sldIdLst>
   <p:sldSz cx="12192000" cy="6858000"/>
   <p:notesSz cx="6858000" cy="9144000"/>
@@ -219,7 +221,7 @@
           <a:p>
             <a:fld id="{68AB4E1C-804C-463D-90D8-E12D92B55F5A}" type="datetimeFigureOut">
               <a:rPr lang="en-US" smtClean="0"/>
-              <a:t>5/11/2016</a:t>
+              <a:t>11-May-16</a:t>
             </a:fld>
             <a:endParaRPr lang="en-US"/>
           </a:p>
@@ -531,6 +533,20 @@
           <a:bodyPr/>
           <a:lstStyle/>
           <a:p>
+            <a:r>
+              <a:rPr lang="en-US" dirty="0" smtClean="0"/>
+              <a:t>Many cities in</a:t>
+            </a:r>
+            <a:r>
+              <a:rPr lang="en-US" baseline="0" dirty="0" smtClean="0"/>
+              <a:t> the Midwest were dropped because of differ definition of rape</a:t>
+            </a:r>
+          </a:p>
+          <a:p>
+            <a:r>
+              <a:rPr lang="en-US" baseline="0" dirty="0" smtClean="0"/>
+              <a:t>Other cities dropped because no LEMAS data</a:t>
+            </a:r>
             <a:endParaRPr lang="en-US" dirty="0"/>
           </a:p>
         </p:txBody>
@@ -552,7 +568,7 @@
           <a:p>
             <a:fld id="{379AA848-7A20-465D-A319-012F3EE62EEB}" type="slidenum">
               <a:rPr lang="en-US" smtClean="0"/>
-              <a:t>5</a:t>
+              <a:t>3</a:t>
             </a:fld>
             <a:endParaRPr lang="en-US"/>
           </a:p>
@@ -561,7 +577,7 @@
     </p:spTree>
     <p:extLst>
       <p:ext uri="{BB962C8B-B14F-4D97-AF65-F5344CB8AC3E}">
-        <p14:creationId xmlns:p14="http://schemas.microsoft.com/office/powerpoint/2010/main" val="2082875433"/>
+        <p14:creationId xmlns:p14="http://schemas.microsoft.com/office/powerpoint/2010/main" val="1150132314"/>
       </p:ext>
     </p:extLst>
   </p:cSld>
@@ -615,143 +631,6 @@
           <a:bodyPr/>
           <a:lstStyle/>
           <a:p>
-            <a:r>
-              <a:rPr lang="en-US" sz="1200" kern="1200" dirty="0" err="1" smtClean="0">
-                <a:solidFill>
-                  <a:schemeClr val="tx1"/>
-                </a:solidFill>
-                <a:latin typeface="+mn-lt"/>
-                <a:ea typeface="+mn-ea"/>
-                <a:cs typeface="+mn-cs"/>
-              </a:rPr>
-              <a:t>racePctWhite</a:t>
-            </a:r>
-            <a:r>
-              <a:rPr lang="en-US" sz="1200" kern="1200" dirty="0" smtClean="0">
-                <a:solidFill>
-                  <a:schemeClr val="tx1"/>
-                </a:solidFill>
-                <a:latin typeface="+mn-lt"/>
-                <a:ea typeface="+mn-ea"/>
-                <a:cs typeface="+mn-cs"/>
-              </a:rPr>
-              <a:t>: percentage of population that is </a:t>
-            </a:r>
-            <a:r>
-              <a:rPr lang="en-US" sz="1200" u="sng" kern="1200" dirty="0" err="1" smtClean="0">
-                <a:solidFill>
-                  <a:schemeClr val="tx1"/>
-                </a:solidFill>
-                <a:latin typeface="+mn-lt"/>
-                <a:ea typeface="+mn-ea"/>
-                <a:cs typeface="+mn-cs"/>
-              </a:rPr>
-              <a:t>caucasian</a:t>
-            </a:r>
-            <a:r>
-              <a:rPr lang="en-US" sz="1200" u="sng" kern="1200" dirty="0" smtClean="0">
-                <a:solidFill>
-                  <a:schemeClr val="tx1"/>
-                </a:solidFill>
-                <a:latin typeface="+mn-lt"/>
-                <a:ea typeface="+mn-ea"/>
-                <a:cs typeface="+mn-cs"/>
-              </a:rPr>
-              <a:t> (numeric - decimal)</a:t>
-            </a:r>
-          </a:p>
-          <a:p>
-            <a:r>
-              <a:rPr lang="en-US" sz="1200" u="none" kern="1200" baseline="0" dirty="0" smtClean="0">
-                <a:solidFill>
-                  <a:schemeClr val="tx1"/>
-                </a:solidFill>
-                <a:latin typeface="+mn-lt"/>
-                <a:ea typeface="+mn-ea"/>
-                <a:cs typeface="+mn-cs"/>
-              </a:rPr>
-              <a:t>	Every other race was inverse of this (African American, Asian, and Hispanic)</a:t>
-            </a:r>
-            <a:endParaRPr lang="en-US" sz="1200" u="none" kern="1200" dirty="0" smtClean="0">
-              <a:solidFill>
-                <a:schemeClr val="tx1"/>
-              </a:solidFill>
-              <a:latin typeface="+mn-lt"/>
-              <a:ea typeface="+mn-ea"/>
-              <a:cs typeface="+mn-cs"/>
-            </a:endParaRPr>
-          </a:p>
-          <a:p>
-            <a:r>
-              <a:rPr lang="en-US" sz="1200" kern="1200" dirty="0" err="1" smtClean="0">
-                <a:solidFill>
-                  <a:schemeClr val="tx1"/>
-                </a:solidFill>
-                <a:latin typeface="+mn-lt"/>
-                <a:ea typeface="+mn-ea"/>
-                <a:cs typeface="+mn-cs"/>
-              </a:rPr>
-              <a:t>pctWInvInc</a:t>
-            </a:r>
-            <a:r>
-              <a:rPr lang="en-US" sz="1200" kern="1200" dirty="0" smtClean="0">
-                <a:solidFill>
-                  <a:schemeClr val="tx1"/>
-                </a:solidFill>
-                <a:latin typeface="+mn-lt"/>
-                <a:ea typeface="+mn-ea"/>
-                <a:cs typeface="+mn-cs"/>
-              </a:rPr>
-              <a:t>: percentage of households with investment / rent income in 1989 (numeric - decimal)</a:t>
-            </a:r>
-          </a:p>
-          <a:p>
-            <a:r>
-              <a:rPr lang="en-US" sz="1200" kern="1200" dirty="0" err="1" smtClean="0">
-                <a:solidFill>
-                  <a:schemeClr val="tx1"/>
-                </a:solidFill>
-                <a:latin typeface="+mn-lt"/>
-                <a:ea typeface="+mn-ea"/>
-                <a:cs typeface="+mn-cs"/>
-              </a:rPr>
-              <a:t>PctNotHSGrad</a:t>
-            </a:r>
-            <a:r>
-              <a:rPr lang="en-US" sz="1200" kern="1200" dirty="0" smtClean="0">
-                <a:solidFill>
-                  <a:schemeClr val="tx1"/>
-                </a:solidFill>
-                <a:latin typeface="+mn-lt"/>
-                <a:ea typeface="+mn-ea"/>
-                <a:cs typeface="+mn-cs"/>
-              </a:rPr>
-              <a:t>: percentage of people 25 and over that are not high school graduates (numeric - decimal)</a:t>
-            </a:r>
-          </a:p>
-          <a:p>
-            <a:r>
-              <a:rPr lang="en-US" sz="1200" kern="1200" dirty="0" err="1" smtClean="0">
-                <a:solidFill>
-                  <a:schemeClr val="tx1"/>
-                </a:solidFill>
-                <a:latin typeface="+mn-lt"/>
-                <a:ea typeface="+mn-ea"/>
-                <a:cs typeface="+mn-cs"/>
-              </a:rPr>
-              <a:t>TotalPctDiv</a:t>
-            </a:r>
-            <a:r>
-              <a:rPr lang="en-US" sz="1200" kern="1200" dirty="0" smtClean="0">
-                <a:solidFill>
-                  <a:schemeClr val="tx1"/>
-                </a:solidFill>
-                <a:latin typeface="+mn-lt"/>
-                <a:ea typeface="+mn-ea"/>
-                <a:cs typeface="+mn-cs"/>
-              </a:rPr>
-              <a:t>: percentage of population who are divorced (numeric - decimal)</a:t>
-            </a:r>
             <a:endParaRPr lang="en-US" dirty="0"/>
           </a:p>
         </p:txBody>
@@ -773,7 +652,7 @@
           <a:p>
             <a:fld id="{379AA848-7A20-465D-A319-012F3EE62EEB}" type="slidenum">
               <a:rPr lang="en-US" smtClean="0"/>
-              <a:t>6</a:t>
+              <a:t>4</a:t>
             </a:fld>
             <a:endParaRPr lang="en-US"/>
           </a:p>
@@ -782,7 +661,7 @@
     </p:spTree>
     <p:extLst>
       <p:ext uri="{BB962C8B-B14F-4D97-AF65-F5344CB8AC3E}">
-        <p14:creationId xmlns:p14="http://schemas.microsoft.com/office/powerpoint/2010/main" val="3598488852"/>
+        <p14:creationId xmlns:p14="http://schemas.microsoft.com/office/powerpoint/2010/main" val="2082875433"/>
       </p:ext>
     </p:extLst>
   </p:cSld>
@@ -837,33 +716,141 @@
           <a:lstStyle/>
           <a:p>
             <a:r>
-              <a:rPr lang="en-US" dirty="0" smtClean="0"/>
-              <a:t>Performed decision tree when k</a:t>
-            </a:r>
-            <a:r>
-              <a:rPr lang="en-US" baseline="0" dirty="0" smtClean="0"/>
-              <a:t> = 5</a:t>
-            </a:r>
-          </a:p>
-          <a:p>
-            <a:r>
-              <a:rPr lang="en-US" baseline="0" dirty="0" smtClean="0"/>
-              <a:t>Similar results -&gt; 3 levels</a:t>
-            </a:r>
-          </a:p>
-          <a:p>
-            <a:endParaRPr lang="en-US" baseline="0" dirty="0" smtClean="0"/>
-          </a:p>
-          <a:p>
-            <a:r>
-              <a:rPr lang="en-US" baseline="0" dirty="0" smtClean="0"/>
-              <a:t>Overall accuracy: 47%</a:t>
-            </a:r>
-          </a:p>
-          <a:p>
-            <a:r>
-              <a:rPr lang="en-US" baseline="0" dirty="0" smtClean="0"/>
-              <a:t>Overall error rate: 53%</a:t>
+              <a:rPr lang="en-US" sz="1200" kern="1200" dirty="0" err="1" smtClean="0">
+                <a:solidFill>
+                  <a:schemeClr val="tx1"/>
+                </a:solidFill>
+                <a:latin typeface="+mn-lt"/>
+                <a:ea typeface="+mn-ea"/>
+                <a:cs typeface="+mn-cs"/>
+              </a:rPr>
+              <a:t>racePctWhite</a:t>
+            </a:r>
+            <a:r>
+              <a:rPr lang="en-US" sz="1200" kern="1200" dirty="0" smtClean="0">
+                <a:solidFill>
+                  <a:schemeClr val="tx1"/>
+                </a:solidFill>
+                <a:latin typeface="+mn-lt"/>
+                <a:ea typeface="+mn-ea"/>
+                <a:cs typeface="+mn-cs"/>
+              </a:rPr>
+              <a:t>: percentage of population that is </a:t>
+            </a:r>
+            <a:r>
+              <a:rPr lang="en-US" sz="1200" u="sng" kern="1200" dirty="0" err="1" smtClean="0">
+                <a:solidFill>
+                  <a:schemeClr val="tx1"/>
+                </a:solidFill>
+                <a:latin typeface="+mn-lt"/>
+                <a:ea typeface="+mn-ea"/>
+                <a:cs typeface="+mn-cs"/>
+              </a:rPr>
+              <a:t>caucasian</a:t>
+            </a:r>
+            <a:r>
+              <a:rPr lang="en-US" sz="1200" u="sng" kern="1200" dirty="0" smtClean="0">
+                <a:solidFill>
+                  <a:schemeClr val="tx1"/>
+                </a:solidFill>
+                <a:latin typeface="+mn-lt"/>
+                <a:ea typeface="+mn-ea"/>
+                <a:cs typeface="+mn-cs"/>
+              </a:rPr>
+              <a:t> (numeric - decimal)</a:t>
+            </a:r>
+          </a:p>
+          <a:p>
+            <a:r>
+              <a:rPr lang="en-US" sz="1200" u="none" kern="1200" baseline="0" dirty="0" smtClean="0">
+                <a:solidFill>
+                  <a:schemeClr val="tx1"/>
+                </a:solidFill>
+                <a:latin typeface="+mn-lt"/>
+                <a:ea typeface="+mn-ea"/>
+                <a:cs typeface="+mn-cs"/>
+              </a:rPr>
+              <a:t>	Every other race was inverse of this (African American, Asian, and Hispanic)</a:t>
+            </a:r>
+            <a:endParaRPr lang="en-US" sz="1200" u="none" kern="1200" dirty="0" smtClean="0">
+              <a:solidFill>
+                <a:schemeClr val="tx1"/>
+              </a:solidFill>
+              <a:latin typeface="+mn-lt"/>
+              <a:ea typeface="+mn-ea"/>
+              <a:cs typeface="+mn-cs"/>
+            </a:endParaRPr>
+          </a:p>
+          <a:p>
+            <a:r>
+              <a:rPr lang="en-US" sz="1200" kern="1200" dirty="0" err="1" smtClean="0">
+                <a:solidFill>
+                  <a:schemeClr val="tx1"/>
+                </a:solidFill>
+                <a:latin typeface="+mn-lt"/>
+                <a:ea typeface="+mn-ea"/>
+                <a:cs typeface="+mn-cs"/>
+              </a:rPr>
+              <a:t>pctWInvInc</a:t>
+            </a:r>
+            <a:r>
+              <a:rPr lang="en-US" sz="1200" kern="1200" dirty="0" smtClean="0">
+                <a:solidFill>
+                  <a:schemeClr val="tx1"/>
+                </a:solidFill>
+                <a:latin typeface="+mn-lt"/>
+                <a:ea typeface="+mn-ea"/>
+                <a:cs typeface="+mn-cs"/>
+              </a:rPr>
+              <a:t>: percentage of households with investment / rent income in 1989 (numeric - decimal)</a:t>
+            </a:r>
+          </a:p>
+          <a:p>
+            <a:r>
+              <a:rPr lang="en-US" sz="1200" kern="1200" dirty="0" err="1" smtClean="0">
+                <a:solidFill>
+                  <a:schemeClr val="tx1"/>
+                </a:solidFill>
+                <a:latin typeface="+mn-lt"/>
+                <a:ea typeface="+mn-ea"/>
+                <a:cs typeface="+mn-cs"/>
+              </a:rPr>
+              <a:t>PctNotHSGrad</a:t>
+            </a:r>
+            <a:r>
+              <a:rPr lang="en-US" sz="1200" kern="1200" dirty="0" smtClean="0">
+                <a:solidFill>
+                  <a:schemeClr val="tx1"/>
+                </a:solidFill>
+                <a:latin typeface="+mn-lt"/>
+                <a:ea typeface="+mn-ea"/>
+                <a:cs typeface="+mn-cs"/>
+              </a:rPr>
+              <a:t>: percentage of people 25 and over that are not high school graduates (numeric - decimal)</a:t>
+            </a:r>
+          </a:p>
+          <a:p>
+            <a:r>
+              <a:rPr lang="en-US" sz="1200" kern="1200" dirty="0" err="1" smtClean="0">
+                <a:solidFill>
+                  <a:schemeClr val="tx1"/>
+                </a:solidFill>
+                <a:latin typeface="+mn-lt"/>
+                <a:ea typeface="+mn-ea"/>
+                <a:cs typeface="+mn-cs"/>
+              </a:rPr>
+              <a:t>TotalPctDiv</a:t>
+            </a:r>
+            <a:r>
+              <a:rPr lang="en-US" sz="1200" kern="1200" dirty="0" smtClean="0">
+                <a:solidFill>
+                  <a:schemeClr val="tx1"/>
+                </a:solidFill>
+                <a:latin typeface="+mn-lt"/>
+                <a:ea typeface="+mn-ea"/>
+                <a:cs typeface="+mn-cs"/>
+              </a:rPr>
+              <a:t>: percentage of population who are divorced (numeric - decimal)</a:t>
             </a:r>
             <a:endParaRPr lang="en-US" dirty="0"/>
           </a:p>
@@ -886,7 +873,7 @@
           <a:p>
             <a:fld id="{379AA848-7A20-465D-A319-012F3EE62EEB}" type="slidenum">
               <a:rPr lang="en-US" smtClean="0"/>
-              <a:t>7</a:t>
+              <a:t>6</a:t>
             </a:fld>
             <a:endParaRPr lang="en-US"/>
           </a:p>
@@ -895,7 +882,7 @@
     </p:spTree>
     <p:extLst>
       <p:ext uri="{BB962C8B-B14F-4D97-AF65-F5344CB8AC3E}">
-        <p14:creationId xmlns:p14="http://schemas.microsoft.com/office/powerpoint/2010/main" val="3107911012"/>
+        <p14:creationId xmlns:p14="http://schemas.microsoft.com/office/powerpoint/2010/main" val="3901802455"/>
       </p:ext>
     </p:extLst>
   </p:cSld>
@@ -950,20 +937,141 @@
           <a:lstStyle/>
           <a:p>
             <a:r>
-              <a:rPr lang="en-US" dirty="0" smtClean="0"/>
-              <a:t>Right</a:t>
-            </a:r>
-            <a:r>
-              <a:rPr lang="en-US" baseline="0" dirty="0" smtClean="0"/>
-              <a:t> Hand Side vs. Left Hand Side </a:t>
-            </a:r>
-            <a:r>
-              <a:rPr lang="en-US" baseline="0" dirty="0" err="1" smtClean="0"/>
-              <a:t>Apriori</a:t>
-            </a:r>
-            <a:r>
-              <a:rPr lang="en-US" baseline="0" dirty="0" smtClean="0"/>
-              <a:t> comparison</a:t>
+              <a:rPr lang="en-US" sz="1200" kern="1200" dirty="0" err="1" smtClean="0">
+                <a:solidFill>
+                  <a:schemeClr val="tx1"/>
+                </a:solidFill>
+                <a:latin typeface="+mn-lt"/>
+                <a:ea typeface="+mn-ea"/>
+                <a:cs typeface="+mn-cs"/>
+              </a:rPr>
+              <a:t>racePctWhite</a:t>
+            </a:r>
+            <a:r>
+              <a:rPr lang="en-US" sz="1200" kern="1200" dirty="0" smtClean="0">
+                <a:solidFill>
+                  <a:schemeClr val="tx1"/>
+                </a:solidFill>
+                <a:latin typeface="+mn-lt"/>
+                <a:ea typeface="+mn-ea"/>
+                <a:cs typeface="+mn-cs"/>
+              </a:rPr>
+              <a:t>: percentage of population that is </a:t>
+            </a:r>
+            <a:r>
+              <a:rPr lang="en-US" sz="1200" u="sng" kern="1200" dirty="0" err="1" smtClean="0">
+                <a:solidFill>
+                  <a:schemeClr val="tx1"/>
+                </a:solidFill>
+                <a:latin typeface="+mn-lt"/>
+                <a:ea typeface="+mn-ea"/>
+                <a:cs typeface="+mn-cs"/>
+              </a:rPr>
+              <a:t>caucasian</a:t>
+            </a:r>
+            <a:r>
+              <a:rPr lang="en-US" sz="1200" u="sng" kern="1200" dirty="0" smtClean="0">
+                <a:solidFill>
+                  <a:schemeClr val="tx1"/>
+                </a:solidFill>
+                <a:latin typeface="+mn-lt"/>
+                <a:ea typeface="+mn-ea"/>
+                <a:cs typeface="+mn-cs"/>
+              </a:rPr>
+              <a:t> (numeric - decimal)</a:t>
+            </a:r>
+          </a:p>
+          <a:p>
+            <a:r>
+              <a:rPr lang="en-US" sz="1200" u="none" kern="1200" baseline="0" dirty="0" smtClean="0">
+                <a:solidFill>
+                  <a:schemeClr val="tx1"/>
+                </a:solidFill>
+                <a:latin typeface="+mn-lt"/>
+                <a:ea typeface="+mn-ea"/>
+                <a:cs typeface="+mn-cs"/>
+              </a:rPr>
+              <a:t>	Every other race was inverse of this (African American, Asian, and Hispanic)</a:t>
+            </a:r>
+            <a:endParaRPr lang="en-US" sz="1200" u="none" kern="1200" dirty="0" smtClean="0">
+              <a:solidFill>
+                <a:schemeClr val="tx1"/>
+              </a:solidFill>
+              <a:latin typeface="+mn-lt"/>
+              <a:ea typeface="+mn-ea"/>
+              <a:cs typeface="+mn-cs"/>
+            </a:endParaRPr>
+          </a:p>
+          <a:p>
+            <a:r>
+              <a:rPr lang="en-US" sz="1200" kern="1200" dirty="0" err="1" smtClean="0">
+                <a:solidFill>
+                  <a:schemeClr val="tx1"/>
+                </a:solidFill>
+                <a:latin typeface="+mn-lt"/>
+                <a:ea typeface="+mn-ea"/>
+                <a:cs typeface="+mn-cs"/>
+              </a:rPr>
+              <a:t>pctWInvInc</a:t>
+            </a:r>
+            <a:r>
+              <a:rPr lang="en-US" sz="1200" kern="1200" dirty="0" smtClean="0">
+                <a:solidFill>
+                  <a:schemeClr val="tx1"/>
+                </a:solidFill>
+                <a:latin typeface="+mn-lt"/>
+                <a:ea typeface="+mn-ea"/>
+                <a:cs typeface="+mn-cs"/>
+              </a:rPr>
+              <a:t>: percentage of households with investment / rent income in 1989 (numeric - decimal)</a:t>
+            </a:r>
+          </a:p>
+          <a:p>
+            <a:r>
+              <a:rPr lang="en-US" sz="1200" kern="1200" dirty="0" err="1" smtClean="0">
+                <a:solidFill>
+                  <a:schemeClr val="tx1"/>
+                </a:solidFill>
+                <a:latin typeface="+mn-lt"/>
+                <a:ea typeface="+mn-ea"/>
+                <a:cs typeface="+mn-cs"/>
+              </a:rPr>
+              <a:t>PctNotHSGrad</a:t>
+            </a:r>
+            <a:r>
+              <a:rPr lang="en-US" sz="1200" kern="1200" dirty="0" smtClean="0">
+                <a:solidFill>
+                  <a:schemeClr val="tx1"/>
+                </a:solidFill>
+                <a:latin typeface="+mn-lt"/>
+                <a:ea typeface="+mn-ea"/>
+                <a:cs typeface="+mn-cs"/>
+              </a:rPr>
+              <a:t>: percentage of people 25 and over that are not high school graduates (numeric - decimal)</a:t>
+            </a:r>
+          </a:p>
+          <a:p>
+            <a:r>
+              <a:rPr lang="en-US" sz="1200" kern="1200" dirty="0" err="1" smtClean="0">
+                <a:solidFill>
+                  <a:schemeClr val="tx1"/>
+                </a:solidFill>
+                <a:latin typeface="+mn-lt"/>
+                <a:ea typeface="+mn-ea"/>
+                <a:cs typeface="+mn-cs"/>
+              </a:rPr>
+              <a:t>TotalPctDiv</a:t>
+            </a:r>
+            <a:r>
+              <a:rPr lang="en-US" sz="1200" kern="1200" dirty="0" smtClean="0">
+                <a:solidFill>
+                  <a:schemeClr val="tx1"/>
+                </a:solidFill>
+                <a:latin typeface="+mn-lt"/>
+                <a:ea typeface="+mn-ea"/>
+                <a:cs typeface="+mn-cs"/>
+              </a:rPr>
+              <a:t>: percentage of population who are divorced (numeric - decimal)</a:t>
             </a:r>
             <a:endParaRPr lang="en-US" dirty="0"/>
           </a:p>
@@ -986,7 +1094,7 @@
           <a:p>
             <a:fld id="{379AA848-7A20-465D-A319-012F3EE62EEB}" type="slidenum">
               <a:rPr lang="en-US" smtClean="0"/>
-              <a:t>8</a:t>
+              <a:t>7</a:t>
             </a:fld>
             <a:endParaRPr lang="en-US"/>
           </a:p>
@@ -995,7 +1103,7 @@
     </p:spTree>
     <p:extLst>
       <p:ext uri="{BB962C8B-B14F-4D97-AF65-F5344CB8AC3E}">
-        <p14:creationId xmlns:p14="http://schemas.microsoft.com/office/powerpoint/2010/main" val="2826107052"/>
+        <p14:creationId xmlns:p14="http://schemas.microsoft.com/office/powerpoint/2010/main" val="3598488852"/>
       </p:ext>
     </p:extLst>
   </p:cSld>
@@ -1051,6 +1159,219 @@
           <a:p>
             <a:r>
               <a:rPr lang="en-US" dirty="0" smtClean="0"/>
+              <a:t>Performed decision tree when k</a:t>
+            </a:r>
+            <a:r>
+              <a:rPr lang="en-US" baseline="0" dirty="0" smtClean="0"/>
+              <a:t> = 5</a:t>
+            </a:r>
+          </a:p>
+          <a:p>
+            <a:r>
+              <a:rPr lang="en-US" baseline="0" dirty="0" smtClean="0"/>
+              <a:t>Similar results -&gt; 3 levels</a:t>
+            </a:r>
+          </a:p>
+          <a:p>
+            <a:endParaRPr lang="en-US" baseline="0" dirty="0" smtClean="0"/>
+          </a:p>
+          <a:p>
+            <a:r>
+              <a:rPr lang="en-US" baseline="0" dirty="0" smtClean="0"/>
+              <a:t>Overall accuracy: 47%</a:t>
+            </a:r>
+          </a:p>
+          <a:p>
+            <a:r>
+              <a:rPr lang="en-US" baseline="0" dirty="0" smtClean="0"/>
+              <a:t>Overall error rate: 53%</a:t>
+            </a:r>
+            <a:endParaRPr lang="en-US" dirty="0"/>
+          </a:p>
+        </p:txBody>
+      </p:sp>
+      <p:sp>
+        <p:nvSpPr>
+          <p:cNvPr id="4" name="Slide Number Placeholder 3"/>
+          <p:cNvSpPr>
+            <a:spLocks noGrp="1"/>
+          </p:cNvSpPr>
+          <p:nvPr>
+            <p:ph type="sldNum" sz="quarter" idx="10"/>
+          </p:nvPr>
+        </p:nvSpPr>
+        <p:spPr/>
+        <p:txBody>
+          <a:bodyPr/>
+          <a:lstStyle/>
+          <a:p>
+            <a:fld id="{379AA848-7A20-465D-A319-012F3EE62EEB}" type="slidenum">
+              <a:rPr lang="en-US" smtClean="0"/>
+              <a:t>8</a:t>
+            </a:fld>
+            <a:endParaRPr lang="en-US"/>
+          </a:p>
+        </p:txBody>
+      </p:sp>
+    </p:spTree>
+    <p:extLst>
+      <p:ext uri="{BB962C8B-B14F-4D97-AF65-F5344CB8AC3E}">
+        <p14:creationId xmlns:p14="http://schemas.microsoft.com/office/powerpoint/2010/main" val="3107911012"/>
+      </p:ext>
+    </p:extLst>
+  </p:cSld>
+  <p:clrMapOvr>
+    <a:masterClrMapping/>
+  </p:clrMapOvr>
+</p:notes>
+</file>
+
+<file path=ppt/notesSlides/notesSlide6.xml><?xml version="1.0" encoding="utf-8"?>
+<p:notes xmlns:a="http://schemas.openxmlformats.org/drawingml/2006/main" xmlns:r="http://schemas.openxmlformats.org/officeDocument/2006/relationships" xmlns:p="http://schemas.openxmlformats.org/presentationml/2006/main">
+  <p:cSld>
+    <p:spTree>
+      <p:nvGrpSpPr>
+        <p:cNvPr id="1" name=""/>
+        <p:cNvGrpSpPr/>
+        <p:nvPr/>
+      </p:nvGrpSpPr>
+      <p:grpSpPr>
+        <a:xfrm>
+          <a:off x="0" y="0"/>
+          <a:ext cx="0" cy="0"/>
+          <a:chOff x="0" y="0"/>
+          <a:chExt cx="0" cy="0"/>
+        </a:xfrm>
+      </p:grpSpPr>
+      <p:sp>
+        <p:nvSpPr>
+          <p:cNvPr id="2" name="Slide Image Placeholder 1"/>
+          <p:cNvSpPr>
+            <a:spLocks noGrp="1" noRot="1" noChangeAspect="1"/>
+          </p:cNvSpPr>
+          <p:nvPr>
+            <p:ph type="sldImg"/>
+          </p:nvPr>
+        </p:nvSpPr>
+        <p:spPr/>
+      </p:sp>
+      <p:sp>
+        <p:nvSpPr>
+          <p:cNvPr id="3" name="Notes Placeholder 2"/>
+          <p:cNvSpPr>
+            <a:spLocks noGrp="1"/>
+          </p:cNvSpPr>
+          <p:nvPr>
+            <p:ph type="body" idx="1"/>
+          </p:nvPr>
+        </p:nvSpPr>
+        <p:spPr/>
+        <p:txBody>
+          <a:bodyPr/>
+          <a:lstStyle/>
+          <a:p>
+            <a:r>
+              <a:rPr lang="en-US" dirty="0" smtClean="0"/>
+              <a:t>Right</a:t>
+            </a:r>
+            <a:r>
+              <a:rPr lang="en-US" baseline="0" dirty="0" smtClean="0"/>
+              <a:t> Hand Side vs. Left Hand Side </a:t>
+            </a:r>
+            <a:r>
+              <a:rPr lang="en-US" baseline="0" dirty="0" err="1" smtClean="0"/>
+              <a:t>Apriori</a:t>
+            </a:r>
+            <a:r>
+              <a:rPr lang="en-US" baseline="0" dirty="0" smtClean="0"/>
+              <a:t> comparison</a:t>
+            </a:r>
+            <a:endParaRPr lang="en-US" dirty="0"/>
+          </a:p>
+        </p:txBody>
+      </p:sp>
+      <p:sp>
+        <p:nvSpPr>
+          <p:cNvPr id="4" name="Slide Number Placeholder 3"/>
+          <p:cNvSpPr>
+            <a:spLocks noGrp="1"/>
+          </p:cNvSpPr>
+          <p:nvPr>
+            <p:ph type="sldNum" sz="quarter" idx="10"/>
+          </p:nvPr>
+        </p:nvSpPr>
+        <p:spPr/>
+        <p:txBody>
+          <a:bodyPr/>
+          <a:lstStyle/>
+          <a:p>
+            <a:fld id="{379AA848-7A20-465D-A319-012F3EE62EEB}" type="slidenum">
+              <a:rPr lang="en-US" smtClean="0"/>
+              <a:t>9</a:t>
+            </a:fld>
+            <a:endParaRPr lang="en-US"/>
+          </a:p>
+        </p:txBody>
+      </p:sp>
+    </p:spTree>
+    <p:extLst>
+      <p:ext uri="{BB962C8B-B14F-4D97-AF65-F5344CB8AC3E}">
+        <p14:creationId xmlns:p14="http://schemas.microsoft.com/office/powerpoint/2010/main" val="2826107052"/>
+      </p:ext>
+    </p:extLst>
+  </p:cSld>
+  <p:clrMapOvr>
+    <a:masterClrMapping/>
+  </p:clrMapOvr>
+</p:notes>
+</file>
+
+<file path=ppt/notesSlides/notesSlide7.xml><?xml version="1.0" encoding="utf-8"?>
+<p:notes xmlns:a="http://schemas.openxmlformats.org/drawingml/2006/main" xmlns:r="http://schemas.openxmlformats.org/officeDocument/2006/relationships" xmlns:p="http://schemas.openxmlformats.org/presentationml/2006/main">
+  <p:cSld>
+    <p:spTree>
+      <p:nvGrpSpPr>
+        <p:cNvPr id="1" name=""/>
+        <p:cNvGrpSpPr/>
+        <p:nvPr/>
+      </p:nvGrpSpPr>
+      <p:grpSpPr>
+        <a:xfrm>
+          <a:off x="0" y="0"/>
+          <a:ext cx="0" cy="0"/>
+          <a:chOff x="0" y="0"/>
+          <a:chExt cx="0" cy="0"/>
+        </a:xfrm>
+      </p:grpSpPr>
+      <p:sp>
+        <p:nvSpPr>
+          <p:cNvPr id="2" name="Slide Image Placeholder 1"/>
+          <p:cNvSpPr>
+            <a:spLocks noGrp="1" noRot="1" noChangeAspect="1"/>
+          </p:cNvSpPr>
+          <p:nvPr>
+            <p:ph type="sldImg"/>
+          </p:nvPr>
+        </p:nvSpPr>
+        <p:spPr/>
+      </p:sp>
+      <p:sp>
+        <p:nvSpPr>
+          <p:cNvPr id="3" name="Notes Placeholder 2"/>
+          <p:cNvSpPr>
+            <a:spLocks noGrp="1"/>
+          </p:cNvSpPr>
+          <p:nvPr>
+            <p:ph type="body" idx="1"/>
+          </p:nvPr>
+        </p:nvSpPr>
+        <p:spPr/>
+        <p:txBody>
+          <a:bodyPr/>
+          <a:lstStyle/>
+          <a:p>
+            <a:r>
+              <a:rPr lang="en-US" dirty="0" smtClean="0"/>
               <a:t>No confidence value; used support instead</a:t>
             </a:r>
           </a:p>
@@ -1088,7 +1409,7 @@
           <a:p>
             <a:fld id="{379AA848-7A20-465D-A319-012F3EE62EEB}" type="slidenum">
               <a:rPr lang="en-US" smtClean="0"/>
-              <a:t>9</a:t>
+              <a:t>10</a:t>
             </a:fld>
             <a:endParaRPr lang="en-US"/>
           </a:p>
@@ -1293,7 +1614,7 @@
           <a:p>
             <a:fld id="{B2C8D8C6-32A1-4BAE-BA07-FB9B53739353}" type="datetimeFigureOut">
               <a:rPr lang="en-US" smtClean="0"/>
-              <a:t>5/11/2016</a:t>
+              <a:t>11-May-16</a:t>
             </a:fld>
             <a:endParaRPr lang="en-US"/>
           </a:p>
@@ -1568,7 +1889,7 @@
           <a:p>
             <a:fld id="{B2C8D8C6-32A1-4BAE-BA07-FB9B53739353}" type="datetimeFigureOut">
               <a:rPr lang="en-US" smtClean="0"/>
-              <a:t>5/11/2016</a:t>
+              <a:t>11-May-16</a:t>
             </a:fld>
             <a:endParaRPr lang="en-US"/>
           </a:p>
@@ -1762,7 +2083,7 @@
           <a:p>
             <a:fld id="{B2C8D8C6-32A1-4BAE-BA07-FB9B53739353}" type="datetimeFigureOut">
               <a:rPr lang="en-US" smtClean="0"/>
-              <a:t>5/11/2016</a:t>
+              <a:t>11-May-16</a:t>
             </a:fld>
             <a:endParaRPr lang="en-US"/>
           </a:p>
@@ -2035,7 +2356,7 @@
           <a:p>
             <a:fld id="{B2C8D8C6-32A1-4BAE-BA07-FB9B53739353}" type="datetimeFigureOut">
               <a:rPr lang="en-US" smtClean="0"/>
-              <a:t>5/11/2016</a:t>
+              <a:t>11-May-16</a:t>
             </a:fld>
             <a:endParaRPr lang="en-US"/>
           </a:p>
@@ -2376,7 +2697,7 @@
           <a:p>
             <a:fld id="{B2C8D8C6-32A1-4BAE-BA07-FB9B53739353}" type="datetimeFigureOut">
               <a:rPr lang="en-US" smtClean="0"/>
-              <a:t>5/11/2016</a:t>
+              <a:t>11-May-16</a:t>
             </a:fld>
             <a:endParaRPr lang="en-US"/>
           </a:p>
@@ -2999,7 +3320,7 @@
           <a:p>
             <a:fld id="{B2C8D8C6-32A1-4BAE-BA07-FB9B53739353}" type="datetimeFigureOut">
               <a:rPr lang="en-US" smtClean="0"/>
-              <a:t>5/11/2016</a:t>
+              <a:t>11-May-16</a:t>
             </a:fld>
             <a:endParaRPr lang="en-US"/>
           </a:p>
@@ -3859,7 +4180,7 @@
           <a:p>
             <a:fld id="{B2C8D8C6-32A1-4BAE-BA07-FB9B53739353}" type="datetimeFigureOut">
               <a:rPr lang="en-US" smtClean="0"/>
-              <a:t>5/11/2016</a:t>
+              <a:t>11-May-16</a:t>
             </a:fld>
             <a:endParaRPr lang="en-US"/>
           </a:p>
@@ -4029,7 +4350,7 @@
           <a:p>
             <a:fld id="{B2C8D8C6-32A1-4BAE-BA07-FB9B53739353}" type="datetimeFigureOut">
               <a:rPr lang="en-US" smtClean="0"/>
-              <a:t>5/11/2016</a:t>
+              <a:t>11-May-16</a:t>
             </a:fld>
             <a:endParaRPr lang="en-US"/>
           </a:p>
@@ -4209,7 +4530,7 @@
           <a:p>
             <a:fld id="{B2C8D8C6-32A1-4BAE-BA07-FB9B53739353}" type="datetimeFigureOut">
               <a:rPr lang="en-US" smtClean="0"/>
-              <a:t>5/11/2016</a:t>
+              <a:t>11-May-16</a:t>
             </a:fld>
             <a:endParaRPr lang="en-US"/>
           </a:p>
@@ -4379,7 +4700,7 @@
           <a:p>
             <a:fld id="{B2C8D8C6-32A1-4BAE-BA07-FB9B53739353}" type="datetimeFigureOut">
               <a:rPr lang="en-US" smtClean="0"/>
-              <a:t>5/11/2016</a:t>
+              <a:t>11-May-16</a:t>
             </a:fld>
             <a:endParaRPr lang="en-US"/>
           </a:p>
@@ -4626,7 +4947,7 @@
           <a:p>
             <a:fld id="{B2C8D8C6-32A1-4BAE-BA07-FB9B53739353}" type="datetimeFigureOut">
               <a:rPr lang="en-US" smtClean="0"/>
-              <a:t>5/11/2016</a:t>
+              <a:t>11-May-16</a:t>
             </a:fld>
             <a:endParaRPr lang="en-US"/>
           </a:p>
@@ -4918,7 +5239,7 @@
           <a:p>
             <a:fld id="{B2C8D8C6-32A1-4BAE-BA07-FB9B53739353}" type="datetimeFigureOut">
               <a:rPr lang="en-US" smtClean="0"/>
-              <a:t>5/11/2016</a:t>
+              <a:t>11-May-16</a:t>
             </a:fld>
             <a:endParaRPr lang="en-US"/>
           </a:p>
@@ -5362,7 +5683,7 @@
           <a:p>
             <a:fld id="{B2C8D8C6-32A1-4BAE-BA07-FB9B53739353}" type="datetimeFigureOut">
               <a:rPr lang="en-US" smtClean="0"/>
-              <a:t>5/11/2016</a:t>
+              <a:t>11-May-16</a:t>
             </a:fld>
             <a:endParaRPr lang="en-US"/>
           </a:p>
@@ -5480,7 +5801,7 @@
           <a:p>
             <a:fld id="{B2C8D8C6-32A1-4BAE-BA07-FB9B53739353}" type="datetimeFigureOut">
               <a:rPr lang="en-US" smtClean="0"/>
-              <a:t>5/11/2016</a:t>
+              <a:t>11-May-16</a:t>
             </a:fld>
             <a:endParaRPr lang="en-US"/>
           </a:p>
@@ -5575,7 +5896,7 @@
           <a:p>
             <a:fld id="{B2C8D8C6-32A1-4BAE-BA07-FB9B53739353}" type="datetimeFigureOut">
               <a:rPr lang="en-US" smtClean="0"/>
-              <a:t>5/11/2016</a:t>
+              <a:t>11-May-16</a:t>
             </a:fld>
             <a:endParaRPr lang="en-US"/>
           </a:p>
@@ -5854,7 +6175,7 @@
           <a:p>
             <a:fld id="{B2C8D8C6-32A1-4BAE-BA07-FB9B53739353}" type="datetimeFigureOut">
               <a:rPr lang="en-US" smtClean="0"/>
-              <a:t>5/11/2016</a:t>
+              <a:t>11-May-16</a:t>
             </a:fld>
             <a:endParaRPr lang="en-US"/>
           </a:p>
@@ -6129,7 +6450,7 @@
           <a:p>
             <a:fld id="{B2C8D8C6-32A1-4BAE-BA07-FB9B53739353}" type="datetimeFigureOut">
               <a:rPr lang="en-US" smtClean="0"/>
-              <a:t>5/11/2016</a:t>
+              <a:t>11-May-16</a:t>
             </a:fld>
             <a:endParaRPr lang="en-US"/>
           </a:p>
@@ -6558,7 +6879,7 @@
           <a:p>
             <a:fld id="{B2C8D8C6-32A1-4BAE-BA07-FB9B53739353}" type="datetimeFigureOut">
               <a:rPr lang="en-US" smtClean="0"/>
-              <a:t>5/11/2016</a:t>
+              <a:t>11-May-16</a:t>
             </a:fld>
             <a:endParaRPr lang="en-US"/>
           </a:p>
@@ -7174,14 +7495,23 @@
             <p:ph type="title"/>
           </p:nvPr>
         </p:nvSpPr>
-        <p:spPr/>
+        <p:spPr>
+          <a:xfrm>
+            <a:off x="646111" y="452718"/>
+            <a:ext cx="9794674" cy="1400530"/>
+          </a:xfrm>
+        </p:spPr>
         <p:txBody>
           <a:bodyPr/>
           <a:lstStyle/>
           <a:p>
             <a:r>
               <a:rPr lang="en-US" dirty="0" smtClean="0"/>
-              <a:t>Conclusions</a:t>
+              <a:t>Results – Frequent Item </a:t>
+            </a:r>
+            <a:r>
+              <a:rPr lang="en-US" dirty="0"/>
+              <a:t>Sets (cont’d)</a:t>
             </a:r>
             <a:endParaRPr lang="en-US" dirty="0"/>
           </a:p>
@@ -7197,7 +7527,12 @@
             <p:ph idx="1"/>
           </p:nvPr>
         </p:nvSpPr>
-        <p:spPr/>
+        <p:spPr>
+          <a:xfrm>
+            <a:off x="1103312" y="1501375"/>
+            <a:ext cx="8946541" cy="4195481"/>
+          </a:xfrm>
+        </p:spPr>
         <p:txBody>
           <a:bodyPr>
             <a:normAutofit/>
@@ -7205,35 +7540,155 @@
           <a:lstStyle/>
           <a:p>
             <a:r>
-              <a:rPr lang="en-US" sz="2400" dirty="0"/>
-              <a:t>Initial findings from scatterplots were consistent with decision trees, frequent item </a:t>
-            </a:r>
-            <a:r>
-              <a:rPr lang="en-US" sz="2400" dirty="0" smtClean="0"/>
-              <a:t>sets</a:t>
-            </a:r>
-          </a:p>
-          <a:p>
+              <a:rPr lang="en-US" sz="2400" dirty="0" err="1" smtClean="0"/>
+              <a:t>Eclat</a:t>
+            </a:r>
             <a:endParaRPr lang="en-US" sz="2400" dirty="0" smtClean="0"/>
           </a:p>
           <a:p>
-            <a:r>
-              <a:rPr lang="en-US" sz="2400" dirty="0" smtClean="0"/>
-              <a:t>High correlation among violent crime, primarily Caucasian communities, investment income, and parental marriage status</a:t>
-            </a:r>
-          </a:p>
-          <a:p>
-            <a:pPr marL="0" indent="0">
-              <a:buNone/>
-            </a:pPr>
             <a:endParaRPr lang="en-US" sz="2400" dirty="0"/>
+          </a:p>
+        </p:txBody>
+      </p:sp>
+      <p:sp>
+        <p:nvSpPr>
+          <p:cNvPr id="4" name="Rectangle 2"/>
+          <p:cNvSpPr>
+            <a:spLocks noChangeArrowheads="1"/>
+          </p:cNvSpPr>
+          <p:nvPr/>
+        </p:nvSpPr>
+        <p:spPr bwMode="auto">
+          <a:xfrm>
+            <a:off x="0" y="0"/>
+            <a:ext cx="12192000" cy="457200"/>
+          </a:xfrm>
+          <a:prstGeom prst="rect">
+            <a:avLst/>
+          </a:prstGeom>
+          <a:noFill/>
+          <a:ln>
+            <a:noFill/>
+          </a:ln>
+          <a:effectLst/>
+          <a:extLst>
+            <a:ext uri="{909E8E84-426E-40DD-AFC4-6F175D3DCCD1}">
+              <a14:hiddenFill xmlns:a14="http://schemas.microsoft.com/office/drawing/2010/main">
+                <a:solidFill>
+                  <a:schemeClr val="accent1"/>
+                </a:solidFill>
+              </a14:hiddenFill>
+            </a:ext>
+            <a:ext uri="{91240B29-F687-4F45-9708-019B960494DF}">
+              <a14:hiddenLine xmlns:a14="http://schemas.microsoft.com/office/drawing/2010/main" w="9525">
+                <a:solidFill>
+                  <a:schemeClr val="tx1"/>
+                </a:solidFill>
+                <a:miter lim="800000"/>
+                <a:headEnd/>
+                <a:tailEnd/>
+              </a14:hiddenLine>
+            </a:ext>
+            <a:ext uri="{AF507438-7753-43E0-B8FC-AC1667EBCBE1}">
+              <a14:hiddenEffects xmlns:a14="http://schemas.microsoft.com/office/drawing/2010/main">
+                <a:effectLst>
+                  <a:outerShdw dist="35921" dir="2700000" algn="ctr" rotWithShape="0">
+                    <a:schemeClr val="bg2"/>
+                  </a:outerShdw>
+                </a:effectLst>
+              </a14:hiddenEffects>
+            </a:ext>
+          </a:extLst>
+        </p:spPr>
+        <p:txBody>
+          <a:bodyPr vert="horz" wrap="none" lIns="91440" tIns="45720" rIns="91440" bIns="45720" numCol="1" anchor="ctr" anchorCtr="0" compatLnSpc="1">
+            <a:prstTxWarp prst="textNoShape">
+              <a:avLst/>
+            </a:prstTxWarp>
+            <a:spAutoFit/>
+          </a:bodyPr>
+          <a:lstStyle/>
+          <a:p>
+            <a:endParaRPr lang="en-US"/>
+          </a:p>
+        </p:txBody>
+      </p:sp>
+      <p:pic>
+        <p:nvPicPr>
+          <p:cNvPr id="6" name="Picture 5"/>
+          <p:cNvPicPr/>
+          <p:nvPr/>
+        </p:nvPicPr>
+        <p:blipFill>
+          <a:blip r:embed="rId3">
+            <a:extLst>
+              <a:ext uri="{28A0092B-C50C-407E-A947-70E740481C1C}">
+                <a14:useLocalDpi xmlns:a14="http://schemas.microsoft.com/office/drawing/2010/main" val="0"/>
+              </a:ext>
+            </a:extLst>
+          </a:blip>
+          <a:stretch>
+            <a:fillRect/>
+          </a:stretch>
+        </p:blipFill>
+        <p:spPr>
+          <a:xfrm>
+            <a:off x="3502140" y="2220686"/>
+            <a:ext cx="5187719" cy="3232331"/>
+          </a:xfrm>
+          <a:prstGeom prst="rect">
+            <a:avLst/>
+          </a:prstGeom>
+        </p:spPr>
+      </p:pic>
+      <p:sp>
+        <p:nvSpPr>
+          <p:cNvPr id="5" name="Rectangle 4"/>
+          <p:cNvSpPr/>
+          <p:nvPr/>
+        </p:nvSpPr>
+        <p:spPr>
+          <a:xfrm>
+            <a:off x="3502140" y="5730297"/>
+            <a:ext cx="5442516" cy="369332"/>
+          </a:xfrm>
+          <a:prstGeom prst="rect">
+            <a:avLst/>
+          </a:prstGeom>
+        </p:spPr>
+        <p:txBody>
+          <a:bodyPr wrap="none">
+            <a:spAutoFit/>
+          </a:bodyPr>
+          <a:lstStyle/>
+          <a:p>
+            <a:r>
+              <a:rPr lang="en-US" b="1" dirty="0"/>
+              <a:t>Table 7. </a:t>
+            </a:r>
+            <a:r>
+              <a:rPr lang="en-US" b="1" dirty="0" err="1"/>
+              <a:t>Eclat</a:t>
+            </a:r>
+            <a:r>
+              <a:rPr lang="en-US" b="1" dirty="0"/>
+              <a:t> </a:t>
+            </a:r>
+            <a:r>
+              <a:rPr lang="en-US" b="1" dirty="0" err="1"/>
+              <a:t>ViolentCrimesPerPop</a:t>
+            </a:r>
+            <a:r>
+              <a:rPr lang="en-US" b="1" dirty="0"/>
+              <a:t> Support Sort</a:t>
+            </a:r>
           </a:p>
         </p:txBody>
       </p:sp>
     </p:spTree>
     <p:extLst>
       <p:ext uri="{BB962C8B-B14F-4D97-AF65-F5344CB8AC3E}">
-        <p14:creationId xmlns:p14="http://schemas.microsoft.com/office/powerpoint/2010/main" val="1040588093"/>
+        <p14:creationId xmlns:p14="http://schemas.microsoft.com/office/powerpoint/2010/main" val="197626889"/>
       </p:ext>
     </p:extLst>
   </p:cSld>
@@ -7277,7 +7732,7 @@
           <a:p>
             <a:r>
               <a:rPr lang="en-US" dirty="0" smtClean="0"/>
-              <a:t>Proposed Solution</a:t>
+              <a:t>Conclusions</a:t>
             </a:r>
             <a:endParaRPr lang="en-US" dirty="0"/>
           </a:p>
@@ -7293,12 +7748,7 @@
             <p:ph idx="1"/>
           </p:nvPr>
         </p:nvSpPr>
-        <p:spPr>
-          <a:xfrm>
-            <a:off x="1103312" y="1380684"/>
-            <a:ext cx="9400255" cy="4899800"/>
-          </a:xfrm>
-        </p:spPr>
+        <p:spPr/>
         <p:txBody>
           <a:bodyPr>
             <a:normAutofit/>
@@ -7306,28 +7756,72 @@
           <a:lstStyle/>
           <a:p>
             <a:r>
-              <a:rPr lang="en-US" dirty="0" smtClean="0"/>
-              <a:t>Additional studies to analyze how changes in any specific attribute is correlated with a change in violent crim</a:t>
-            </a:r>
-            <a:r>
-              <a:rPr lang="en-US" dirty="0" smtClean="0"/>
-              <a:t>e per capita</a:t>
+              <a:rPr lang="en-US" sz="2400" dirty="0" smtClean="0"/>
+              <a:t>Violent Crime relationships:</a:t>
             </a:r>
           </a:p>
           <a:p>
             <a:pPr lvl="1"/>
             <a:r>
-              <a:rPr lang="en-US" dirty="0" smtClean="0"/>
-              <a:t>Will require additional data sets in preceding and succeeding years.</a:t>
-            </a:r>
-            <a:endParaRPr lang="en-US" dirty="0" smtClean="0"/>
+              <a:rPr lang="en-US" sz="2200" dirty="0" smtClean="0"/>
+              <a:t>Proportional relationship:</a:t>
+            </a:r>
+            <a:endParaRPr lang="en-US" sz="2200" dirty="0"/>
+          </a:p>
+          <a:p>
+            <a:pPr lvl="2"/>
+            <a:r>
+              <a:rPr lang="en-US" sz="2000" dirty="0" smtClean="0"/>
+              <a:t>Higher percentage of divorcees</a:t>
+            </a:r>
+          </a:p>
+          <a:p>
+            <a:pPr lvl="2"/>
+            <a:r>
+              <a:rPr lang="en-US" sz="2000" dirty="0" smtClean="0"/>
+              <a:t>Large percentage of population who do not have a high school degree</a:t>
+            </a:r>
+            <a:endParaRPr lang="en-US" sz="2000" dirty="0" smtClean="0"/>
+          </a:p>
+          <a:p>
+            <a:pPr lvl="1"/>
+            <a:r>
+              <a:rPr lang="en-US" sz="2200" dirty="0"/>
+              <a:t>Inversely </a:t>
+            </a:r>
+            <a:r>
+              <a:rPr lang="en-US" sz="2200" dirty="0" smtClean="0"/>
+              <a:t>Proportional </a:t>
+            </a:r>
+            <a:r>
+              <a:rPr lang="en-US" sz="2200" dirty="0"/>
+              <a:t>relationship:</a:t>
+            </a:r>
+          </a:p>
+          <a:p>
+            <a:pPr lvl="2"/>
+            <a:r>
+              <a:rPr lang="en-US" sz="2000" dirty="0"/>
+              <a:t>Communities with higher percentage of investment income</a:t>
+            </a:r>
+          </a:p>
+          <a:p>
+            <a:pPr lvl="2"/>
+            <a:r>
+              <a:rPr lang="en-US" sz="2000" dirty="0"/>
+              <a:t>Largely Caucasian </a:t>
+            </a:r>
+            <a:r>
+              <a:rPr lang="en-US" sz="2000" dirty="0" smtClean="0"/>
+              <a:t>communities</a:t>
+            </a:r>
           </a:p>
         </p:txBody>
       </p:sp>
     </p:spTree>
     <p:extLst>
       <p:ext uri="{BB962C8B-B14F-4D97-AF65-F5344CB8AC3E}">
-        <p14:creationId xmlns:p14="http://schemas.microsoft.com/office/powerpoint/2010/main" val="1947831433"/>
+        <p14:creationId xmlns:p14="http://schemas.microsoft.com/office/powerpoint/2010/main" val="1040588093"/>
       </p:ext>
     </p:extLst>
   </p:cSld>
@@ -7371,7 +7865,7 @@
           <a:p>
             <a:r>
               <a:rPr lang="en-US" dirty="0" smtClean="0"/>
-              <a:t>Questions/Comments</a:t>
+              <a:t>Conclusions (cont’d)</a:t>
             </a:r>
             <a:endParaRPr lang="en-US" dirty="0"/>
           </a:p>
@@ -7396,37 +7890,225 @@
           <a:p>
             <a:r>
               <a:rPr lang="en-US" sz="2400" dirty="0" smtClean="0"/>
-              <a:t>Was Google Flu Trend’s model too simple?</a:t>
+              <a:t>Attribute relationships:</a:t>
             </a:r>
           </a:p>
           <a:p>
             <a:pPr lvl="1"/>
             <a:r>
-              <a:rPr lang="en-US" sz="2400" dirty="0" smtClean="0"/>
-              <a:t>CDC uses models to predict spread of disease </a:t>
-            </a:r>
-          </a:p>
-          <a:p>
-            <a:pPr lvl="2"/>
-            <a:r>
-              <a:rPr lang="en-US" sz="2400" dirty="0" smtClean="0"/>
-              <a:t>Should that model have been built into algorithm to determine whether</a:t>
-            </a:r>
-          </a:p>
-          <a:p>
-            <a:pPr lvl="2"/>
-            <a:endParaRPr lang="en-US" sz="2400" dirty="0"/>
-          </a:p>
-          <a:p>
-            <a:pPr lvl="2"/>
-            <a:endParaRPr lang="en-US" sz="2400" dirty="0" smtClean="0"/>
-          </a:p>
-          <a:p>
-            <a:r>
-              <a:rPr lang="en-US" sz="2800" smtClean="0"/>
-              <a:t>Additional comments…</a:t>
-            </a:r>
-            <a:endParaRPr lang="en-US" sz="2800" dirty="0"/>
+              <a:rPr lang="en-US" sz="2200" dirty="0" smtClean="0"/>
+              <a:t>Lower percentage of population without high school diploma frequently found with lower percentage of divorcees and higher percentage of Caucasians</a:t>
+            </a:r>
+          </a:p>
+          <a:p>
+            <a:pPr lvl="1"/>
+            <a:r>
+              <a:rPr lang="en-US" sz="2200" dirty="0" smtClean="0"/>
+              <a:t>Higher percentage of Caucasians in the community frequently associated with higher percentage of population with investment income</a:t>
+            </a:r>
+          </a:p>
+          <a:p>
+            <a:pPr lvl="1"/>
+            <a:r>
+              <a:rPr lang="en-US" sz="2200" dirty="0"/>
+              <a:t>Higher percentage of Caucasians were frequently found with </a:t>
+            </a:r>
+            <a:r>
+              <a:rPr lang="en-US" sz="2200" dirty="0" smtClean="0"/>
+              <a:t>low to mid </a:t>
+            </a:r>
+            <a:r>
+              <a:rPr lang="en-US" sz="2200" dirty="0"/>
+              <a:t>percentage of divorcees</a:t>
+            </a:r>
+          </a:p>
+          <a:p>
+            <a:pPr lvl="1"/>
+            <a:endParaRPr lang="en-US" sz="2200" dirty="0"/>
+          </a:p>
+        </p:txBody>
+      </p:sp>
+    </p:spTree>
+    <p:extLst>
+      <p:ext uri="{BB962C8B-B14F-4D97-AF65-F5344CB8AC3E}">
+        <p14:creationId xmlns:p14="http://schemas.microsoft.com/office/powerpoint/2010/main" val="1168880082"/>
+      </p:ext>
+    </p:extLst>
+  </p:cSld>
+  <p:clrMapOvr>
+    <a:masterClrMapping/>
+  </p:clrMapOvr>
+</p:sld>
+</file>
+
+<file path=ppt/slides/slide13.xml><?xml version="1.0" encoding="utf-8"?>
+<p:sld xmlns:a="http://schemas.openxmlformats.org/drawingml/2006/main" xmlns:r="http://schemas.openxmlformats.org/officeDocument/2006/relationships" xmlns:p="http://schemas.openxmlformats.org/presentationml/2006/main">
+  <p:cSld>
+    <p:spTree>
+      <p:nvGrpSpPr>
+        <p:cNvPr id="1" name=""/>
+        <p:cNvGrpSpPr/>
+        <p:nvPr/>
+      </p:nvGrpSpPr>
+      <p:grpSpPr>
+        <a:xfrm>
+          <a:off x="0" y="0"/>
+          <a:ext cx="0" cy="0"/>
+          <a:chOff x="0" y="0"/>
+          <a:chExt cx="0" cy="0"/>
+        </a:xfrm>
+      </p:grpSpPr>
+      <p:sp>
+        <p:nvSpPr>
+          <p:cNvPr id="2" name="Title 1"/>
+          <p:cNvSpPr>
+            <a:spLocks noGrp="1"/>
+          </p:cNvSpPr>
+          <p:nvPr>
+            <p:ph type="title"/>
+          </p:nvPr>
+        </p:nvSpPr>
+        <p:spPr/>
+        <p:txBody>
+          <a:bodyPr/>
+          <a:lstStyle/>
+          <a:p>
+            <a:r>
+              <a:rPr lang="en-US" dirty="0" smtClean="0"/>
+              <a:t>Proposed </a:t>
+            </a:r>
+            <a:r>
+              <a:rPr lang="en-US" dirty="0" smtClean="0"/>
+              <a:t>Future Analysis</a:t>
+            </a:r>
+            <a:endParaRPr lang="en-US" dirty="0"/>
+          </a:p>
+        </p:txBody>
+      </p:sp>
+      <p:sp>
+        <p:nvSpPr>
+          <p:cNvPr id="3" name="Content Placeholder 2"/>
+          <p:cNvSpPr>
+            <a:spLocks noGrp="1"/>
+          </p:cNvSpPr>
+          <p:nvPr>
+            <p:ph idx="1"/>
+          </p:nvPr>
+        </p:nvSpPr>
+        <p:spPr>
+          <a:xfrm>
+            <a:off x="1103312" y="1380684"/>
+            <a:ext cx="9400255" cy="4899800"/>
+          </a:xfrm>
+        </p:spPr>
+        <p:txBody>
+          <a:bodyPr>
+            <a:normAutofit/>
+          </a:bodyPr>
+          <a:lstStyle/>
+          <a:p>
+            <a:r>
+              <a:rPr lang="en-US" dirty="0" smtClean="0"/>
+              <a:t>Additional studies to analyze how changes in any specific attribute is correlated with a change in violent crime per capita</a:t>
+            </a:r>
+          </a:p>
+          <a:p>
+            <a:pPr lvl="1"/>
+            <a:r>
+              <a:rPr lang="en-US" dirty="0" smtClean="0"/>
+              <a:t>Will require additional data sets in preceding and succeeding years</a:t>
+            </a:r>
+            <a:r>
+              <a:rPr lang="en-US" dirty="0" smtClean="0"/>
+              <a:t>.</a:t>
+            </a:r>
+          </a:p>
+          <a:p>
+            <a:pPr lvl="1"/>
+            <a:r>
+              <a:rPr lang="en-US" dirty="0" smtClean="0"/>
+              <a:t>Would help to determine outliers for improved </a:t>
+            </a:r>
+            <a:r>
+              <a:rPr lang="en-US" dirty="0"/>
+              <a:t>results</a:t>
+            </a:r>
+          </a:p>
+          <a:p>
+            <a:pPr lvl="1"/>
+            <a:endParaRPr lang="en-US" dirty="0" smtClean="0"/>
+          </a:p>
+        </p:txBody>
+      </p:sp>
+    </p:spTree>
+    <p:extLst>
+      <p:ext uri="{BB962C8B-B14F-4D97-AF65-F5344CB8AC3E}">
+        <p14:creationId xmlns:p14="http://schemas.microsoft.com/office/powerpoint/2010/main" val="1947831433"/>
+      </p:ext>
+    </p:extLst>
+  </p:cSld>
+  <p:clrMapOvr>
+    <a:masterClrMapping/>
+  </p:clrMapOvr>
+</p:sld>
+</file>
+
+<file path=ppt/slides/slide14.xml><?xml version="1.0" encoding="utf-8"?>
+<p:sld xmlns:a="http://schemas.openxmlformats.org/drawingml/2006/main" xmlns:r="http://schemas.openxmlformats.org/officeDocument/2006/relationships" xmlns:p="http://schemas.openxmlformats.org/presentationml/2006/main">
+  <p:cSld>
+    <p:spTree>
+      <p:nvGrpSpPr>
+        <p:cNvPr id="1" name=""/>
+        <p:cNvGrpSpPr/>
+        <p:nvPr/>
+      </p:nvGrpSpPr>
+      <p:grpSpPr>
+        <a:xfrm>
+          <a:off x="0" y="0"/>
+          <a:ext cx="0" cy="0"/>
+          <a:chOff x="0" y="0"/>
+          <a:chExt cx="0" cy="0"/>
+        </a:xfrm>
+      </p:grpSpPr>
+      <p:sp>
+        <p:nvSpPr>
+          <p:cNvPr id="2" name="Title 1"/>
+          <p:cNvSpPr>
+            <a:spLocks noGrp="1"/>
+          </p:cNvSpPr>
+          <p:nvPr>
+            <p:ph type="title"/>
+          </p:nvPr>
+        </p:nvSpPr>
+        <p:spPr/>
+        <p:txBody>
+          <a:bodyPr/>
+          <a:lstStyle/>
+          <a:p>
+            <a:r>
+              <a:rPr lang="en-US" dirty="0" smtClean="0"/>
+              <a:t>Questions/Comments</a:t>
+            </a:r>
+            <a:endParaRPr lang="en-US" dirty="0"/>
+          </a:p>
+        </p:txBody>
+      </p:sp>
+      <p:sp>
+        <p:nvSpPr>
+          <p:cNvPr id="4" name="Content Placeholder 3"/>
+          <p:cNvSpPr>
+            <a:spLocks noGrp="1"/>
+          </p:cNvSpPr>
+          <p:nvPr>
+            <p:ph idx="1"/>
+          </p:nvPr>
+        </p:nvSpPr>
+        <p:spPr/>
+        <p:txBody>
+          <a:bodyPr/>
+          <a:lstStyle/>
+          <a:p>
+            <a:endParaRPr lang="en-US"/>
           </a:p>
         </p:txBody>
       </p:sp>
@@ -7502,34 +8184,80 @@
           <a:p>
             <a:r>
               <a:rPr lang="en-US" sz="2400" dirty="0" smtClean="0"/>
-              <a:t>Author: Michael Redmond</a:t>
-            </a:r>
+              <a:t>Author: Michael </a:t>
+            </a:r>
+            <a:r>
+              <a:rPr lang="en-US" sz="2400" dirty="0" smtClean="0"/>
+              <a:t>Redmond</a:t>
+            </a:r>
+            <a:endParaRPr lang="en-US" sz="2400" dirty="0" smtClean="0"/>
+          </a:p>
+          <a:p>
+            <a:r>
+              <a:rPr lang="en-US" sz="2400" dirty="0" smtClean="0"/>
+              <a:t>Title: Communities and </a:t>
+            </a:r>
+            <a:r>
+              <a:rPr lang="en-US" sz="2400" dirty="0" smtClean="0"/>
+              <a:t>Crime</a:t>
+            </a:r>
+            <a:endParaRPr lang="en-US" sz="2400" dirty="0" smtClean="0"/>
+          </a:p>
+          <a:p>
+            <a:r>
+              <a:rPr lang="en-US" sz="2400" dirty="0" smtClean="0"/>
+              <a:t>Sources:</a:t>
+            </a:r>
+          </a:p>
+          <a:p>
+            <a:pPr lvl="1"/>
+            <a:r>
+              <a:rPr lang="en-US" sz="2200" dirty="0" smtClean="0"/>
+              <a:t>1995 </a:t>
+            </a:r>
+            <a:r>
+              <a:rPr lang="en-US" sz="2200" dirty="0" smtClean="0"/>
+              <a:t>Federal Bureau of Investigation Uniform Crime </a:t>
+            </a:r>
+            <a:r>
+              <a:rPr lang="en-US" sz="2200" dirty="0" smtClean="0"/>
+              <a:t>Report</a:t>
+            </a:r>
+          </a:p>
+          <a:p>
+            <a:pPr lvl="1"/>
+            <a:r>
+              <a:rPr lang="en-US" sz="2200" dirty="0" smtClean="0"/>
+              <a:t>1990 US Census</a:t>
+            </a:r>
+          </a:p>
+          <a:p>
+            <a:pPr lvl="1"/>
+            <a:r>
+              <a:rPr lang="en-US" sz="2200" dirty="0" smtClean="0"/>
+              <a:t>1990 LEMAS Survey</a:t>
+            </a:r>
+            <a:endParaRPr lang="en-US" sz="2200" dirty="0" smtClean="0"/>
+          </a:p>
+          <a:p>
+            <a:r>
+              <a:rPr lang="en-US" sz="2400" dirty="0">
+                <a:hlinkClick r:id="rId2"/>
+              </a:rPr>
+              <a:t>https://</a:t>
+            </a:r>
+            <a:r>
+              <a:rPr lang="en-US" sz="2400" dirty="0" smtClean="0">
+                <a:hlinkClick r:id="rId2"/>
+              </a:rPr>
+              <a:t>archive.ics.uci.edu/ml/datasets/Communities+and+Crime</a:t>
+            </a:r>
+            <a:endParaRPr lang="en-US" sz="2400" dirty="0" smtClean="0"/>
           </a:p>
           <a:p>
             <a:pPr marL="0" indent="0">
               <a:buNone/>
             </a:pPr>
-            <a:endParaRPr lang="en-US" sz="2400" dirty="0" smtClean="0"/>
-          </a:p>
-          <a:p>
-            <a:r>
-              <a:rPr lang="en-US" sz="2400" dirty="0" smtClean="0"/>
-              <a:t>Title: Communities and Crime</a:t>
-            </a:r>
-          </a:p>
-          <a:p>
-            <a:pPr marL="0" indent="0">
-              <a:buNone/>
-            </a:pPr>
-            <a:endParaRPr lang="en-US" sz="2400" dirty="0" smtClean="0"/>
-          </a:p>
-          <a:p>
-            <a:r>
-              <a:rPr lang="en-US" sz="2400" dirty="0" smtClean="0"/>
-              <a:t>Source: 1995 Federal Bureau of Investigation Uniform Crime Report</a:t>
-            </a:r>
-          </a:p>
-          <a:p>
             <a:endParaRPr lang="en-US" sz="2400" dirty="0"/>
           </a:p>
         </p:txBody>
@@ -7620,11 +8348,7 @@
             <a:pPr lvl="1"/>
             <a:r>
               <a:rPr lang="en-US" sz="2200" dirty="0" smtClean="0"/>
-              <a:t>Focus </a:t>
-            </a:r>
-            <a:r>
-              <a:rPr lang="en-US" sz="2200" dirty="0" smtClean="0"/>
-              <a:t>attribute: Per Capita Violent Crimes</a:t>
+              <a:t>Focus attribute: Per Capita Violent Crimes</a:t>
             </a:r>
           </a:p>
           <a:p>
@@ -7633,7 +8357,6 @@
               <a:rPr lang="en-US" sz="2200" dirty="0" smtClean="0"/>
               <a:t>127 other attributes</a:t>
             </a:r>
-            <a:endParaRPr lang="en-US" sz="2200" dirty="0" smtClean="0"/>
           </a:p>
           <a:p>
             <a:pPr lvl="1"/>
@@ -7646,15 +8369,15 @@
             <a:pPr lvl="2"/>
             <a:r>
               <a:rPr lang="en-US" sz="2000" dirty="0" smtClean="0"/>
-              <a:t>Violent crime </a:t>
+              <a:t>Violent crime definition </a:t>
             </a:r>
             <a:r>
               <a:rPr lang="en-US" sz="2000" dirty="0" smtClean="0"/>
-              <a:t>definition differences among jurisdictions, </a:t>
+              <a:t>differs </a:t>
             </a:r>
             <a:r>
               <a:rPr lang="en-US" sz="2000" dirty="0" smtClean="0"/>
-              <a:t>police departments with at least 100 police officers, etc.</a:t>
+              <a:t>among jurisdictions, police departments with at least 100 police officers, etc.</a:t>
             </a:r>
           </a:p>
           <a:p>
@@ -7708,8 +8431,8 @@
           <a:lstStyle/>
           <a:p>
             <a:r>
-              <a:rPr lang="en-US" dirty="0" smtClean="0"/>
-              <a:t>Background</a:t>
+              <a:rPr lang="en-US" dirty="0"/>
+              <a:t>Data Set (cont’d)</a:t>
             </a:r>
             <a:endParaRPr lang="en-US" dirty="0"/>
           </a:p>
@@ -7725,63 +8448,54 @@
             <p:ph idx="1"/>
           </p:nvPr>
         </p:nvSpPr>
-        <p:spPr>
-          <a:xfrm>
-            <a:off x="927699" y="1610857"/>
-            <a:ext cx="8946541" cy="4659314"/>
-          </a:xfrm>
-        </p:spPr>
+        <p:spPr/>
         <p:txBody>
           <a:bodyPr>
             <a:normAutofit/>
           </a:bodyPr>
           <a:lstStyle/>
           <a:p>
+            <a:pPr marL="342900" lvl="1" indent="-342900"/>
             <a:r>
               <a:rPr lang="en-US" sz="2400" dirty="0" smtClean="0"/>
-              <a:t>Objective: </a:t>
-            </a:r>
-          </a:p>
-          <a:p>
-            <a:pPr lvl="1"/>
-            <a:r>
-              <a:rPr lang="en-US" sz="2400" dirty="0" smtClean="0"/>
-              <a:t>Explore </a:t>
-            </a:r>
-            <a:r>
-              <a:rPr lang="en-US" sz="2400" dirty="0"/>
-              <a:t>other </a:t>
-            </a:r>
-            <a:r>
-              <a:rPr lang="en-US" sz="2400" dirty="0" smtClean="0"/>
-              <a:t>indicators/attributes </a:t>
-            </a:r>
-            <a:r>
-              <a:rPr lang="en-US" sz="2400" dirty="0"/>
-              <a:t>of communities along with </a:t>
-            </a:r>
-            <a:r>
-              <a:rPr lang="en-US" sz="2400" dirty="0" smtClean="0"/>
-              <a:t>the incidence of </a:t>
-            </a:r>
-            <a:r>
-              <a:rPr lang="en-US" sz="2400" dirty="0"/>
-              <a:t>violent crime to determine what relationships exist and suggest further areas of study</a:t>
-            </a:r>
-            <a:r>
-              <a:rPr lang="en-US" sz="2400" dirty="0" smtClean="0"/>
-              <a:t>.</a:t>
-            </a:r>
-          </a:p>
-          <a:p>
-            <a:endParaRPr lang="en-US" sz="2600" dirty="0"/>
+              <a:t>Pre-processing</a:t>
+            </a:r>
+            <a:endParaRPr lang="en-US" sz="2400" dirty="0" smtClean="0"/>
+          </a:p>
+          <a:p>
+            <a:pPr marL="742950" lvl="2" indent="-342900"/>
+            <a:r>
+              <a:rPr lang="en-US" sz="2200" dirty="0" smtClean="0"/>
+              <a:t>Already </a:t>
+            </a:r>
+            <a:r>
+              <a:rPr lang="en-US" sz="2200" dirty="0" smtClean="0"/>
+              <a:t>normalized (numeric fields between 0.00 and 1.00)</a:t>
+            </a:r>
+          </a:p>
+          <a:p>
+            <a:pPr marL="742950" lvl="2" indent="-342900"/>
+            <a:r>
+              <a:rPr lang="en-US" sz="2200" dirty="0" smtClean="0"/>
+              <a:t>Equal Width Binning (for Classification and Frequent Itemset analysis)</a:t>
+            </a:r>
+          </a:p>
+          <a:p>
+            <a:pPr marL="742950" lvl="2" indent="-342900"/>
+            <a:r>
+              <a:rPr lang="en-US" sz="2200" dirty="0" smtClean="0"/>
+              <a:t>Holdout Method (for Classification)</a:t>
+            </a:r>
+          </a:p>
+          <a:p>
+            <a:endParaRPr lang="en-US" sz="2400" dirty="0"/>
           </a:p>
         </p:txBody>
       </p:sp>
     </p:spTree>
     <p:extLst>
       <p:ext uri="{BB962C8B-B14F-4D97-AF65-F5344CB8AC3E}">
-        <p14:creationId xmlns:p14="http://schemas.microsoft.com/office/powerpoint/2010/main" val="3768458800"/>
+        <p14:creationId xmlns:p14="http://schemas.microsoft.com/office/powerpoint/2010/main" val="2117577309"/>
       </p:ext>
     </p:extLst>
   </p:cSld>
@@ -7825,7 +8539,7 @@
           <a:p>
             <a:r>
               <a:rPr lang="en-US" dirty="0" smtClean="0"/>
-              <a:t>Pre-Processing</a:t>
+              <a:t>Background</a:t>
             </a:r>
             <a:endParaRPr lang="en-US" dirty="0"/>
           </a:p>
@@ -7841,96 +8555,67 @@
             <p:ph idx="1"/>
           </p:nvPr>
         </p:nvSpPr>
-        <p:spPr/>
+        <p:spPr>
+          <a:xfrm>
+            <a:off x="927699" y="1610857"/>
+            <a:ext cx="8946541" cy="4659314"/>
+          </a:xfrm>
+        </p:spPr>
         <p:txBody>
           <a:bodyPr>
-            <a:normAutofit fontScale="92500" lnSpcReduction="20000"/>
+            <a:normAutofit/>
           </a:bodyPr>
           <a:lstStyle/>
           <a:p>
-            <a:pPr marL="342900" lvl="1" indent="-342900"/>
             <a:r>
               <a:rPr lang="en-US" sz="2400" dirty="0" smtClean="0"/>
-              <a:t>1994 instances + 128 attributes!</a:t>
-            </a:r>
-          </a:p>
-          <a:p>
-            <a:pPr marL="0" lvl="1" indent="0">
-              <a:buNone/>
-            </a:pPr>
-            <a:endParaRPr lang="en-US" sz="2400" dirty="0" smtClean="0"/>
-          </a:p>
-          <a:p>
-            <a:pPr marL="342900" lvl="1" indent="-342900"/>
+              <a:t>Objective: </a:t>
+            </a:r>
+          </a:p>
+          <a:p>
+            <a:pPr lvl="1"/>
             <a:r>
               <a:rPr lang="en-US" sz="2400" dirty="0" smtClean="0"/>
-              <a:t>Already </a:t>
+              <a:t>Explore </a:t>
+            </a:r>
+            <a:r>
+              <a:rPr lang="en-US" sz="2400" dirty="0"/>
+              <a:t>other </a:t>
             </a:r>
             <a:r>
               <a:rPr lang="en-US" sz="2400" dirty="0" smtClean="0"/>
-              <a:t>normalized</a:t>
-            </a:r>
-          </a:p>
-          <a:p>
-            <a:pPr marL="0" lvl="1" indent="0">
-              <a:buNone/>
-            </a:pPr>
-            <a:endParaRPr lang="en-US" sz="2400" dirty="0" smtClean="0"/>
-          </a:p>
-          <a:p>
-            <a:pPr marL="342900" lvl="1" indent="-342900"/>
+              <a:t>indicators/attributes </a:t>
+            </a:r>
+            <a:r>
+              <a:rPr lang="en-US" sz="2400" dirty="0"/>
+              <a:t>of communities along with </a:t>
+            </a:r>
             <a:r>
               <a:rPr lang="en-US" sz="2400" dirty="0" smtClean="0"/>
-              <a:t>Classification - Holdout Method</a:t>
-            </a:r>
-            <a:endParaRPr lang="en-US" sz="2400" dirty="0" smtClean="0"/>
-          </a:p>
-          <a:p>
-            <a:pPr marL="342900" lvl="1" indent="-342900"/>
-            <a:endParaRPr lang="en-US" sz="2400" dirty="0"/>
-          </a:p>
-          <a:p>
-            <a:pPr marL="342900" lvl="1" indent="-342900"/>
+              <a:t>incidences </a:t>
+            </a:r>
             <a:r>
               <a:rPr lang="en-US" sz="2400" dirty="0" smtClean="0"/>
-              <a:t>Binning (equal width)</a:t>
-            </a:r>
-          </a:p>
-          <a:p>
-            <a:pPr marL="342900" lvl="1" indent="-342900"/>
-            <a:endParaRPr lang="en-US" sz="2400" dirty="0" smtClean="0"/>
-          </a:p>
-          <a:p>
-            <a:pPr marL="342900" lvl="1" indent="-342900"/>
+              <a:t>of </a:t>
+            </a:r>
+            <a:r>
+              <a:rPr lang="en-US" sz="2400" dirty="0"/>
+              <a:t>violent crime to determine what relationships exist and suggest further areas of study</a:t>
+            </a:r>
             <a:r>
               <a:rPr lang="en-US" sz="2400" dirty="0" smtClean="0"/>
-              <a:t>Scatterplots</a:t>
-            </a:r>
-            <a:r>
-              <a:rPr lang="en-US" sz="2400" b="1" dirty="0" smtClean="0"/>
-              <a:t/>
-            </a:r>
-            <a:br>
-              <a:rPr lang="en-US" sz="2400" b="1" dirty="0" smtClean="0"/>
-            </a:br>
-            <a:r>
-              <a:rPr lang="en-US" sz="2400" b="1" dirty="0" smtClean="0"/>
-              <a:t/>
-            </a:r>
-            <a:br>
-              <a:rPr lang="en-US" sz="2400" b="1" dirty="0" smtClean="0"/>
-            </a:br>
-            <a:endParaRPr lang="en-US" sz="2400" b="1" dirty="0"/>
-          </a:p>
-          <a:p>
-            <a:endParaRPr lang="en-US" sz="2400" dirty="0"/>
+              <a:t>.</a:t>
+            </a:r>
+          </a:p>
+          <a:p>
+            <a:endParaRPr lang="en-US" sz="2600" dirty="0"/>
           </a:p>
         </p:txBody>
       </p:sp>
     </p:spTree>
     <p:extLst>
       <p:ext uri="{BB962C8B-B14F-4D97-AF65-F5344CB8AC3E}">
-        <p14:creationId xmlns:p14="http://schemas.microsoft.com/office/powerpoint/2010/main" val="2117577309"/>
+        <p14:creationId xmlns:p14="http://schemas.microsoft.com/office/powerpoint/2010/main" val="3768458800"/>
       </p:ext>
     </p:extLst>
   </p:cSld>
@@ -8008,15 +8693,187 @@
             </a:pPr>
             <a:r>
               <a:rPr lang="en-US" sz="2600" dirty="0" smtClean="0"/>
-              <a:t>Most Significant Attributes out of 122 plausible </a:t>
-            </a:r>
-            <a:r>
-              <a:rPr lang="en-US" sz="2600" dirty="0" err="1" smtClean="0"/>
-              <a:t>attirbutes</a:t>
+              <a:t>Attributes </a:t>
+            </a:r>
+            <a:r>
+              <a:rPr lang="en-US" sz="2600" dirty="0" smtClean="0"/>
+              <a:t>most commonly believed to influence incidents of Violent Crime</a:t>
             </a:r>
             <a:r>
               <a:rPr lang="en-US" sz="2600" dirty="0" smtClean="0"/>
               <a:t>:</a:t>
+            </a:r>
+            <a:endParaRPr lang="en-US" sz="2600" dirty="0" smtClean="0"/>
+          </a:p>
+          <a:p>
+            <a:pPr marL="1257300" lvl="2" indent="-457200">
+              <a:buFont typeface="Wingdings" panose="05000000000000000000" pitchFamily="2" charset="2"/>
+              <a:buChar char="Ø"/>
+            </a:pPr>
+            <a:r>
+              <a:rPr lang="en-US" sz="2400" dirty="0" smtClean="0"/>
+              <a:t>% Police per </a:t>
+            </a:r>
+            <a:r>
+              <a:rPr lang="en-US" sz="2400" dirty="0" err="1" smtClean="0"/>
+              <a:t>captia</a:t>
+            </a:r>
+            <a:endParaRPr lang="en-US" sz="2400" dirty="0" smtClean="0"/>
+          </a:p>
+          <a:p>
+            <a:pPr marL="1257300" lvl="2" indent="-457200">
+              <a:buFont typeface="Wingdings" panose="05000000000000000000" pitchFamily="2" charset="2"/>
+              <a:buChar char="Ø"/>
+            </a:pPr>
+            <a:r>
+              <a:rPr lang="en-US" sz="2400" dirty="0" smtClean="0"/>
+              <a:t>Per Capita </a:t>
+            </a:r>
+            <a:r>
+              <a:rPr lang="en-US" sz="2400" dirty="0" smtClean="0"/>
+              <a:t>Income</a:t>
+            </a:r>
+          </a:p>
+          <a:p>
+            <a:pPr marL="1257300" lvl="2" indent="-457200">
+              <a:buFont typeface="Wingdings" panose="05000000000000000000" pitchFamily="2" charset="2"/>
+              <a:buChar char="Ø"/>
+            </a:pPr>
+            <a:r>
+              <a:rPr lang="en-US" sz="2400" dirty="0" smtClean="0"/>
+              <a:t>% with Bachelor’s or higher degree</a:t>
+            </a:r>
+            <a:endParaRPr lang="en-US" sz="2400" dirty="0" smtClean="0"/>
+          </a:p>
+          <a:p>
+            <a:pPr marL="1257300" lvl="2" indent="-457200">
+              <a:buFont typeface="Wingdings" panose="05000000000000000000" pitchFamily="2" charset="2"/>
+              <a:buChar char="Ø"/>
+            </a:pPr>
+            <a:endParaRPr lang="en-US" sz="2400" dirty="0"/>
+          </a:p>
+        </p:txBody>
+      </p:sp>
+      <p:pic>
+        <p:nvPicPr>
+          <p:cNvPr id="4" name="Picture 3"/>
+          <p:cNvPicPr>
+            <a:picLocks noChangeAspect="1"/>
+          </p:cNvPicPr>
+          <p:nvPr/>
+        </p:nvPicPr>
+        <p:blipFill>
+          <a:blip r:embed="rId3">
+            <a:extLst>
+              <a:ext uri="{28A0092B-C50C-407E-A947-70E740481C1C}">
+                <a14:useLocalDpi xmlns:a14="http://schemas.microsoft.com/office/drawing/2010/main" val="0"/>
+              </a:ext>
+            </a:extLst>
+          </a:blip>
+          <a:stretch>
+            <a:fillRect/>
+          </a:stretch>
+        </p:blipFill>
+        <p:spPr>
+          <a:xfrm>
+            <a:off x="4556823" y="1886856"/>
+            <a:ext cx="7431976" cy="4762887"/>
+          </a:xfrm>
+          <a:prstGeom prst="rect">
+            <a:avLst/>
+          </a:prstGeom>
+        </p:spPr>
+      </p:pic>
+    </p:spTree>
+    <p:extLst>
+      <p:ext uri="{BB962C8B-B14F-4D97-AF65-F5344CB8AC3E}">
+        <p14:creationId xmlns:p14="http://schemas.microsoft.com/office/powerpoint/2010/main" val="267143276"/>
+      </p:ext>
+    </p:extLst>
+  </p:cSld>
+  <p:clrMapOvr>
+    <a:masterClrMapping/>
+  </p:clrMapOvr>
+</p:sld>
+</file>
+
+<file path=ppt/slides/slide7.xml><?xml version="1.0" encoding="utf-8"?>
+<p:sld xmlns:a="http://schemas.openxmlformats.org/drawingml/2006/main" xmlns:r="http://schemas.openxmlformats.org/officeDocument/2006/relationships" xmlns:p="http://schemas.openxmlformats.org/presentationml/2006/main">
+  <p:cSld>
+    <p:spTree>
+      <p:nvGrpSpPr>
+        <p:cNvPr id="1" name=""/>
+        <p:cNvGrpSpPr/>
+        <p:nvPr/>
+      </p:nvGrpSpPr>
+      <p:grpSpPr>
+        <a:xfrm>
+          <a:off x="0" y="0"/>
+          <a:ext cx="0" cy="0"/>
+          <a:chOff x="0" y="0"/>
+          <a:chExt cx="0" cy="0"/>
+        </a:xfrm>
+      </p:grpSpPr>
+      <p:sp>
+        <p:nvSpPr>
+          <p:cNvPr id="2" name="Title 1"/>
+          <p:cNvSpPr>
+            <a:spLocks noGrp="1"/>
+          </p:cNvSpPr>
+          <p:nvPr>
+            <p:ph type="title"/>
+          </p:nvPr>
+        </p:nvSpPr>
+        <p:spPr/>
+        <p:txBody>
+          <a:bodyPr/>
+          <a:lstStyle/>
+          <a:p>
+            <a:r>
+              <a:rPr lang="en-US" dirty="0" smtClean="0"/>
+              <a:t>Exploratory Data </a:t>
+            </a:r>
+            <a:r>
+              <a:rPr lang="en-US" dirty="0" smtClean="0"/>
+              <a:t>Analysis (cont’d)</a:t>
+            </a:r>
+            <a:endParaRPr lang="en-US" dirty="0"/>
+          </a:p>
+        </p:txBody>
+      </p:sp>
+      <p:sp>
+        <p:nvSpPr>
+          <p:cNvPr id="3" name="Content Placeholder 2"/>
+          <p:cNvSpPr>
+            <a:spLocks noGrp="1"/>
+          </p:cNvSpPr>
+          <p:nvPr>
+            <p:ph idx="1"/>
+          </p:nvPr>
+        </p:nvSpPr>
+        <p:spPr>
+          <a:xfrm>
+            <a:off x="1" y="2061028"/>
+            <a:ext cx="4499428" cy="4332513"/>
+          </a:xfrm>
+        </p:spPr>
+        <p:txBody>
+          <a:bodyPr>
+            <a:normAutofit/>
+          </a:bodyPr>
+          <a:lstStyle/>
+          <a:p>
+            <a:pPr marL="857250" lvl="1" indent="-457200">
+              <a:buFont typeface="Wingdings" panose="05000000000000000000" pitchFamily="2" charset="2"/>
+              <a:buChar char="Ø"/>
+            </a:pPr>
+            <a:r>
+              <a:rPr lang="en-US" sz="2600" dirty="0" smtClean="0"/>
+              <a:t>Most Significant Attributes out of 122 plausible </a:t>
+            </a:r>
+            <a:r>
+              <a:rPr lang="en-US" sz="2600" dirty="0" smtClean="0"/>
+              <a:t>attributes:</a:t>
             </a:r>
             <a:endParaRPr lang="en-US" sz="2600" dirty="0" smtClean="0"/>
           </a:p>
@@ -8112,7 +8969,7 @@
 </p:sld>
 </file>
 
-<file path=ppt/slides/slide7.xml><?xml version="1.0" encoding="utf-8"?>
+<file path=ppt/slides/slide8.xml><?xml version="1.0" encoding="utf-8"?>
 <p:sld xmlns:a="http://schemas.openxmlformats.org/drawingml/2006/main" xmlns:r="http://schemas.openxmlformats.org/officeDocument/2006/relationships" xmlns:p="http://schemas.openxmlformats.org/presentationml/2006/main">
   <p:cSld>
     <p:spTree>
@@ -8242,14 +9099,154 @@
           </a:p>
         </p:txBody>
       </p:sp>
+      <p:sp>
+        <p:nvSpPr>
+          <p:cNvPr id="7" name="Rectangle 6"/>
+          <p:cNvSpPr/>
+          <p:nvPr/>
+        </p:nvSpPr>
+        <p:spPr>
+          <a:xfrm>
+            <a:off x="6665746" y="4846319"/>
+            <a:ext cx="4698722" cy="369332"/>
+          </a:xfrm>
+          <a:prstGeom prst="rect">
+            <a:avLst/>
+          </a:prstGeom>
+        </p:spPr>
+        <p:txBody>
+          <a:bodyPr wrap="none">
+            <a:spAutoFit/>
+          </a:bodyPr>
+          <a:lstStyle/>
+          <a:p>
+            <a:r>
+              <a:rPr lang="en-US" b="1" dirty="0"/>
+              <a:t>Figure 6. </a:t>
+            </a:r>
+            <a:r>
+              <a:rPr lang="en-US" b="1" dirty="0" smtClean="0"/>
+              <a:t>Confusion </a:t>
+            </a:r>
+            <a:r>
+              <a:rPr lang="en-US" b="1" dirty="0" smtClean="0"/>
+              <a:t>Matrix</a:t>
+            </a:r>
+            <a:r>
+              <a:rPr lang="en-US" b="1" dirty="0" smtClean="0"/>
+              <a:t> </a:t>
+            </a:r>
+            <a:r>
+              <a:rPr lang="en-US" b="1" dirty="0"/>
+              <a:t>– </a:t>
+            </a:r>
+            <a:r>
+              <a:rPr lang="en-US" b="1" dirty="0" smtClean="0"/>
+              <a:t>Binning </a:t>
+            </a:r>
+            <a:r>
+              <a:rPr lang="en-US" b="1" i="1" dirty="0"/>
+              <a:t>k</a:t>
+            </a:r>
+            <a:r>
+              <a:rPr lang="en-US" b="1" dirty="0"/>
+              <a:t> = </a:t>
+            </a:r>
+            <a:r>
+              <a:rPr lang="en-US" b="1" dirty="0"/>
+              <a:t>5</a:t>
+            </a:r>
+            <a:endParaRPr lang="en-US" b="1" dirty="0"/>
+          </a:p>
+        </p:txBody>
+      </p:sp>
+      <p:sp>
+        <p:nvSpPr>
+          <p:cNvPr id="9" name="Rectangle 8"/>
+          <p:cNvSpPr/>
+          <p:nvPr/>
+        </p:nvSpPr>
+        <p:spPr>
+          <a:xfrm>
+            <a:off x="534058" y="6245627"/>
+            <a:ext cx="5860900" cy="369332"/>
+          </a:xfrm>
+          <a:prstGeom prst="rect">
+            <a:avLst/>
+          </a:prstGeom>
+        </p:spPr>
+        <p:txBody>
+          <a:bodyPr wrap="none">
+            <a:spAutoFit/>
+          </a:bodyPr>
+          <a:lstStyle/>
+          <a:p>
+            <a:r>
+              <a:rPr lang="en-US" b="1" dirty="0"/>
+              <a:t>Figure 5. Classification Decision Tree – Binning </a:t>
+            </a:r>
+            <a:r>
+              <a:rPr lang="en-US" b="1" i="1" dirty="0"/>
+              <a:t>k</a:t>
+            </a:r>
+            <a:r>
+              <a:rPr lang="en-US" b="1" dirty="0"/>
+              <a:t> = </a:t>
+            </a:r>
+            <a:r>
+              <a:rPr lang="en-US" b="1" dirty="0"/>
+              <a:t>5</a:t>
+            </a:r>
+            <a:endParaRPr lang="en-US" b="1" dirty="0"/>
+          </a:p>
+        </p:txBody>
+      </p:sp>
       <p:pic>
         <p:nvPicPr>
-          <p:cNvPr id="8" name="Picture 7"/>
+          <p:cNvPr id="11" name="Picture 10"/>
           <p:cNvPicPr/>
           <p:nvPr/>
         </p:nvPicPr>
         <p:blipFill>
-          <a:blip r:embed="rId3" cstate="print">
+          <a:blip r:embed="rId3">
+            <a:extLst>
+              <a:ext uri="{28A0092B-C50C-407E-A947-70E740481C1C}">
+                <a14:useLocalDpi xmlns:a14="http://schemas.microsoft.com/office/drawing/2010/main" val="0"/>
+              </a:ext>
+            </a:extLst>
+          </a:blip>
+          <a:stretch>
+            <a:fillRect/>
+          </a:stretch>
+        </p:blipFill>
+        <p:spPr bwMode="auto">
+          <a:xfrm>
+            <a:off x="833017" y="2704496"/>
+            <a:ext cx="5262983" cy="3396225"/>
+          </a:xfrm>
+          <a:prstGeom prst="rect">
+            <a:avLst/>
+          </a:prstGeom>
+          <a:ln>
+            <a:noFill/>
+          </a:ln>
+          <a:extLst>
+            <a:ext uri="{53640926-AAD7-44D8-BBD7-CCE9431645EC}">
+              <a14:shadowObscured xmlns:a14="http://schemas.microsoft.com/office/drawing/2010/main"/>
+            </a:ext>
+          </a:extLst>
+        </p:spPr>
+      </p:pic>
+      <p:pic>
+        <p:nvPicPr>
+          <p:cNvPr id="10" name="Picture 9"/>
+          <p:cNvPicPr>
+            <a:picLocks noChangeAspect="1"/>
+          </p:cNvPicPr>
+          <p:nvPr/>
+        </p:nvPicPr>
+        <p:blipFill>
+          <a:blip r:embed="rId4">
             <a:extLst>
               <a:ext uri="{28A0092B-C50C-407E-A947-70E740481C1C}">
                 <a14:useLocalDpi xmlns:a14="http://schemas.microsoft.com/office/drawing/2010/main" val="0"/>
@@ -8262,119 +9259,12 @@
         </p:blipFill>
         <p:spPr>
           <a:xfrm>
-            <a:off x="6889491" y="2938073"/>
-            <a:ext cx="4797091" cy="3072884"/>
+            <a:off x="7797325" y="3655998"/>
+            <a:ext cx="2698889" cy="990651"/>
           </a:xfrm>
           <a:prstGeom prst="rect">
             <a:avLst/>
           </a:prstGeom>
-        </p:spPr>
-      </p:pic>
-      <p:sp>
-        <p:nvSpPr>
-          <p:cNvPr id="7" name="Rectangle 6"/>
-          <p:cNvSpPr/>
-          <p:nvPr/>
-        </p:nvSpPr>
-        <p:spPr>
-          <a:xfrm>
-            <a:off x="6632495" y="6242367"/>
-            <a:ext cx="5291833" cy="369332"/>
-          </a:xfrm>
-          <a:prstGeom prst="rect">
-            <a:avLst/>
-          </a:prstGeom>
-        </p:spPr>
-        <p:txBody>
-          <a:bodyPr wrap="none">
-            <a:spAutoFit/>
-          </a:bodyPr>
-          <a:lstStyle/>
-          <a:p>
-            <a:r>
-              <a:rPr lang="en-US" b="1" dirty="0"/>
-              <a:t>Figure 6. Relative Error and CP – Binning </a:t>
-            </a:r>
-            <a:r>
-              <a:rPr lang="en-US" b="1" i="1" dirty="0"/>
-              <a:t>k</a:t>
-            </a:r>
-            <a:r>
-              <a:rPr lang="en-US" b="1" dirty="0"/>
-              <a:t> = 10</a:t>
-            </a:r>
-          </a:p>
-        </p:txBody>
-      </p:sp>
-      <p:sp>
-        <p:nvSpPr>
-          <p:cNvPr id="9" name="Rectangle 8"/>
-          <p:cNvSpPr/>
-          <p:nvPr/>
-        </p:nvSpPr>
-        <p:spPr>
-          <a:xfrm>
-            <a:off x="222516" y="6242367"/>
-            <a:ext cx="5990743" cy="369332"/>
-          </a:xfrm>
-          <a:prstGeom prst="rect">
-            <a:avLst/>
-          </a:prstGeom>
-        </p:spPr>
-        <p:txBody>
-          <a:bodyPr wrap="none">
-            <a:spAutoFit/>
-          </a:bodyPr>
-          <a:lstStyle/>
-          <a:p>
-            <a:r>
-              <a:rPr lang="en-US" b="1" dirty="0"/>
-              <a:t>Figure 5. Classification Decision Tree – Binning </a:t>
-            </a:r>
-            <a:r>
-              <a:rPr lang="en-US" b="1" i="1" dirty="0"/>
-              <a:t>k</a:t>
-            </a:r>
-            <a:r>
-              <a:rPr lang="en-US" b="1" dirty="0"/>
-              <a:t> = 10</a:t>
-            </a:r>
-          </a:p>
-        </p:txBody>
-      </p:sp>
-      <p:pic>
-        <p:nvPicPr>
-          <p:cNvPr id="11" name="Picture 10"/>
-          <p:cNvPicPr/>
-          <p:nvPr/>
-        </p:nvPicPr>
-        <p:blipFill rotWithShape="1">
-          <a:blip r:embed="rId4" cstate="print">
-            <a:extLst>
-              <a:ext uri="{28A0092B-C50C-407E-A947-70E740481C1C}">
-                <a14:useLocalDpi xmlns:a14="http://schemas.microsoft.com/office/drawing/2010/main" val="0"/>
-              </a:ext>
-            </a:extLst>
-          </a:blip>
-          <a:srcRect l="6532" t="10656" r="2594" b="12887"/>
-          <a:stretch/>
-        </p:blipFill>
-        <p:spPr bwMode="auto">
-          <a:xfrm>
-            <a:off x="366980" y="2938073"/>
-            <a:ext cx="5701814" cy="3072884"/>
-          </a:xfrm>
-          <a:prstGeom prst="rect">
-            <a:avLst/>
-          </a:prstGeom>
-          <a:ln>
-            <a:noFill/>
-          </a:ln>
-          <a:extLst>
-            <a:ext uri="{53640926-AAD7-44D8-BBD7-CCE9431645EC}">
-              <a14:shadowObscured xmlns:a14="http://schemas.microsoft.com/office/drawing/2010/main"/>
-            </a:ext>
-          </a:extLst>
         </p:spPr>
       </p:pic>
     </p:spTree>
@@ -8390,7 +9280,7 @@
 </p:sld>
 </file>
 
-<file path=ppt/slides/slide8.xml><?xml version="1.0" encoding="utf-8"?>
+<file path=ppt/slides/slide9.xml><?xml version="1.0" encoding="utf-8"?>
 <p:sld xmlns:a="http://schemas.openxmlformats.org/drawingml/2006/main" xmlns:r="http://schemas.openxmlformats.org/officeDocument/2006/relationships" xmlns:p="http://schemas.openxmlformats.org/presentationml/2006/main">
   <p:cSld>
     <p:spTree>
@@ -8705,227 +9595,6 @@
     <p:extLst>
       <p:ext uri="{BB962C8B-B14F-4D97-AF65-F5344CB8AC3E}">
         <p14:creationId xmlns:p14="http://schemas.microsoft.com/office/powerpoint/2010/main" val="1937515719"/>
-      </p:ext>
-    </p:extLst>
-  </p:cSld>
-  <p:clrMapOvr>
-    <a:masterClrMapping/>
-  </p:clrMapOvr>
-</p:sld>
-</file>
-
-<file path=ppt/slides/slide9.xml><?xml version="1.0" encoding="utf-8"?>
-<p:sld xmlns:a="http://schemas.openxmlformats.org/drawingml/2006/main" xmlns:r="http://schemas.openxmlformats.org/officeDocument/2006/relationships" xmlns:p="http://schemas.openxmlformats.org/presentationml/2006/main">
-  <p:cSld>
-    <p:spTree>
-      <p:nvGrpSpPr>
-        <p:cNvPr id="1" name=""/>
-        <p:cNvGrpSpPr/>
-        <p:nvPr/>
-      </p:nvGrpSpPr>
-      <p:grpSpPr>
-        <a:xfrm>
-          <a:off x="0" y="0"/>
-          <a:ext cx="0" cy="0"/>
-          <a:chOff x="0" y="0"/>
-          <a:chExt cx="0" cy="0"/>
-        </a:xfrm>
-      </p:grpSpPr>
-      <p:sp>
-        <p:nvSpPr>
-          <p:cNvPr id="2" name="Title 1"/>
-          <p:cNvSpPr>
-            <a:spLocks noGrp="1"/>
-          </p:cNvSpPr>
-          <p:nvPr>
-            <p:ph type="title"/>
-          </p:nvPr>
-        </p:nvSpPr>
-        <p:spPr/>
-        <p:txBody>
-          <a:bodyPr/>
-          <a:lstStyle/>
-          <a:p>
-            <a:r>
-              <a:rPr lang="en-US" dirty="0" smtClean="0"/>
-              <a:t>Results – Frequent Item Sets</a:t>
-            </a:r>
-            <a:endParaRPr lang="en-US" dirty="0"/>
-          </a:p>
-        </p:txBody>
-      </p:sp>
-      <p:sp>
-        <p:nvSpPr>
-          <p:cNvPr id="3" name="Content Placeholder 2"/>
-          <p:cNvSpPr>
-            <a:spLocks noGrp="1"/>
-          </p:cNvSpPr>
-          <p:nvPr>
-            <p:ph idx="1"/>
-          </p:nvPr>
-        </p:nvSpPr>
-        <p:spPr>
-          <a:xfrm>
-            <a:off x="1103312" y="1501375"/>
-            <a:ext cx="8946541" cy="4195481"/>
-          </a:xfrm>
-        </p:spPr>
-        <p:txBody>
-          <a:bodyPr>
-            <a:normAutofit/>
-          </a:bodyPr>
-          <a:lstStyle/>
-          <a:p>
-            <a:r>
-              <a:rPr lang="en-US" sz="2400" dirty="0" err="1" smtClean="0"/>
-              <a:t>Eclat</a:t>
-            </a:r>
-            <a:endParaRPr lang="en-US" sz="2400" dirty="0" smtClean="0"/>
-          </a:p>
-          <a:p>
-            <a:endParaRPr lang="en-US" sz="2400" dirty="0"/>
-          </a:p>
-        </p:txBody>
-      </p:sp>
-      <p:sp>
-        <p:nvSpPr>
-          <p:cNvPr id="4" name="Rectangle 2"/>
-          <p:cNvSpPr>
-            <a:spLocks noChangeArrowheads="1"/>
-          </p:cNvSpPr>
-          <p:nvPr/>
-        </p:nvSpPr>
-        <p:spPr bwMode="auto">
-          <a:xfrm>
-            <a:off x="0" y="0"/>
-            <a:ext cx="12192000" cy="457200"/>
-          </a:xfrm>
-          <a:prstGeom prst="rect">
-            <a:avLst/>
-          </a:prstGeom>
-          <a:noFill/>
-          <a:ln>
-            <a:noFill/>
-          </a:ln>
-          <a:effectLst/>
-          <a:extLst>
-            <a:ext uri="{909E8E84-426E-40DD-AFC4-6F175D3DCCD1}">
-              <a14:hiddenFill xmlns:a14="http://schemas.microsoft.com/office/drawing/2010/main">
-                <a:solidFill>
-                  <a:schemeClr val="accent1"/>
-                </a:solidFill>
-              </a14:hiddenFill>
-            </a:ext>
-            <a:ext uri="{91240B29-F687-4F45-9708-019B960494DF}">
-              <a14:hiddenLine xmlns:a14="http://schemas.microsoft.com/office/drawing/2010/main" w="9525">
-                <a:solidFill>
-                  <a:schemeClr val="tx1"/>
-                </a:solidFill>
-                <a:miter lim="800000"/>
-                <a:headEnd/>
-                <a:tailEnd/>
-              </a14:hiddenLine>
-            </a:ext>
-            <a:ext uri="{AF507438-7753-43E0-B8FC-AC1667EBCBE1}">
-              <a14:hiddenEffects xmlns:a14="http://schemas.microsoft.com/office/drawing/2010/main">
-                <a:effectLst>
-                  <a:outerShdw dist="35921" dir="2700000" algn="ctr" rotWithShape="0">
-                    <a:schemeClr val="bg2"/>
-                  </a:outerShdw>
-                </a:effectLst>
-              </a14:hiddenEffects>
-            </a:ext>
-          </a:extLst>
-        </p:spPr>
-        <p:txBody>
-          <a:bodyPr vert="horz" wrap="none" lIns="91440" tIns="45720" rIns="91440" bIns="45720" numCol="1" anchor="ctr" anchorCtr="0" compatLnSpc="1">
-            <a:prstTxWarp prst="textNoShape">
-              <a:avLst/>
-            </a:prstTxWarp>
-            <a:spAutoFit/>
-          </a:bodyPr>
-          <a:lstStyle/>
-          <a:p>
-            <a:endParaRPr lang="en-US"/>
-          </a:p>
-        </p:txBody>
-      </p:sp>
-      <p:pic>
-        <p:nvPicPr>
-          <p:cNvPr id="6" name="Picture 5"/>
-          <p:cNvPicPr/>
-          <p:nvPr/>
-        </p:nvPicPr>
-        <p:blipFill>
-          <a:blip r:embed="rId3">
-            <a:extLst>
-              <a:ext uri="{28A0092B-C50C-407E-A947-70E740481C1C}">
-                <a14:useLocalDpi xmlns:a14="http://schemas.microsoft.com/office/drawing/2010/main" val="0"/>
-              </a:ext>
-            </a:extLst>
-          </a:blip>
-          <a:stretch>
-            <a:fillRect/>
-          </a:stretch>
-        </p:blipFill>
-        <p:spPr>
-          <a:xfrm>
-            <a:off x="3502140" y="2220686"/>
-            <a:ext cx="5187719" cy="3232331"/>
-          </a:xfrm>
-          <a:prstGeom prst="rect">
-            <a:avLst/>
-          </a:prstGeom>
-        </p:spPr>
-      </p:pic>
-      <p:sp>
-        <p:nvSpPr>
-          <p:cNvPr id="5" name="Rectangle 4"/>
-          <p:cNvSpPr/>
-          <p:nvPr/>
-        </p:nvSpPr>
-        <p:spPr>
-          <a:xfrm>
-            <a:off x="3502140" y="5730297"/>
-            <a:ext cx="5442516" cy="369332"/>
-          </a:xfrm>
-          <a:prstGeom prst="rect">
-            <a:avLst/>
-          </a:prstGeom>
-        </p:spPr>
-        <p:txBody>
-          <a:bodyPr wrap="none">
-            <a:spAutoFit/>
-          </a:bodyPr>
-          <a:lstStyle/>
-          <a:p>
-            <a:r>
-              <a:rPr lang="en-US" b="1" dirty="0"/>
-              <a:t>Table 7. </a:t>
-            </a:r>
-            <a:r>
-              <a:rPr lang="en-US" b="1" dirty="0" err="1"/>
-              <a:t>Eclat</a:t>
-            </a:r>
-            <a:r>
-              <a:rPr lang="en-US" b="1" dirty="0"/>
-              <a:t> </a:t>
-            </a:r>
-            <a:r>
-              <a:rPr lang="en-US" b="1" dirty="0" err="1"/>
-              <a:t>ViolentCrimesPerPop</a:t>
-            </a:r>
-            <a:r>
-              <a:rPr lang="en-US" b="1" dirty="0"/>
-              <a:t> Support Sort</a:t>
-            </a:r>
-          </a:p>
-        </p:txBody>
-      </p:sp>
-    </p:spTree>
-    <p:extLst>
-      <p:ext uri="{BB962C8B-B14F-4D97-AF65-F5344CB8AC3E}">
-        <p14:creationId xmlns:p14="http://schemas.microsoft.com/office/powerpoint/2010/main" val="197626889"/>
       </p:ext>
     </p:extLst>
   </p:cSld>

</xml_diff>

<commit_message>
Updated powerpoint for submission.
</commit_message>
<xml_diff>
--- a/GroupProject/GroupProject.pptx
+++ b/GroupProject/GroupProject.pptx
@@ -735,18 +735,7 @@
                 <a:ea typeface="+mn-ea"/>
                 <a:cs typeface="+mn-cs"/>
               </a:rPr>
-              <a:t>Caucasian </a:t>
-            </a:r>
-            <a:r>
-              <a:rPr lang="en-US" sz="1200" u="sng" kern="1200" dirty="0" smtClean="0">
-                <a:solidFill>
-                  <a:schemeClr val="tx1"/>
-                </a:solidFill>
-                <a:latin typeface="+mn-lt"/>
-                <a:ea typeface="+mn-ea"/>
-                <a:cs typeface="+mn-cs"/>
-              </a:rPr>
-              <a:t>(numeric - decimal)</a:t>
+              <a:t>Caucasian (numeric - decimal)</a:t>
             </a:r>
           </a:p>
           <a:p>
@@ -7396,11 +7385,19 @@
           <a:p>
             <a:r>
               <a:rPr lang="en-US" dirty="0" smtClean="0"/>
-              <a:t>Results – Frequent Item </a:t>
+              <a:t>Results – Frequent </a:t>
+            </a:r>
+            <a:r>
+              <a:rPr lang="en-US" dirty="0" err="1" smtClean="0"/>
+              <a:t>Itemsets</a:t>
+            </a:r>
+            <a:r>
+              <a:rPr lang="en-US" dirty="0" smtClean="0"/>
+              <a:t> </a:t>
             </a:r>
             <a:r>
               <a:rPr lang="en-US" dirty="0"/>
-              <a:t>Sets (cont’d)</a:t>
+              <a:t>(cont’d)</a:t>
             </a:r>
           </a:p>
         </p:txBody>
@@ -8198,13 +8195,8 @@
             <a:pPr lvl="1"/>
             <a:r>
               <a:rPr lang="en-US" sz="2200" dirty="0" smtClean="0"/>
-              <a:t>127 other </a:t>
-            </a:r>
-            <a:r>
-              <a:rPr lang="en-US" sz="2200" dirty="0" smtClean="0"/>
-              <a:t>attributes</a:t>
-            </a:r>
-            <a:endParaRPr lang="en-US" sz="2200" dirty="0" smtClean="0"/>
+              <a:t>127 other attributes</a:t>
+            </a:r>
           </a:p>
           <a:p>
             <a:pPr lvl="1"/>
@@ -8533,13 +8525,8 @@
             </a:pPr>
             <a:r>
               <a:rPr lang="en-US" sz="2400" dirty="0" smtClean="0"/>
-              <a:t>% Police per </a:t>
-            </a:r>
-            <a:r>
-              <a:rPr lang="en-US" sz="2400" dirty="0" smtClean="0"/>
-              <a:t>capita</a:t>
-            </a:r>
-            <a:endParaRPr lang="en-US" sz="2400" dirty="0" smtClean="0"/>
+              <a:t>% Police per capita</a:t>
+            </a:r>
           </a:p>
           <a:p>
             <a:pPr marL="1257300" lvl="2" indent="-457200">
@@ -9103,7 +9090,11 @@
           <a:p>
             <a:r>
               <a:rPr lang="en-US" dirty="0" smtClean="0"/>
-              <a:t>Results – Frequent Item Sets</a:t>
+              <a:t>Results – Frequent </a:t>
+            </a:r>
+            <a:r>
+              <a:rPr lang="en-US" dirty="0" err="1" smtClean="0"/>
+              <a:t>Itemsets</a:t>
             </a:r>
             <a:endParaRPr lang="en-US" dirty="0"/>
           </a:p>

</xml_diff>